<commit_message>
Update UG with edit remark and autofill
</commit_message>
<xml_diff>
--- a/docs/diagrams/AutofillCommandDiagram.pptx
+++ b/docs/diagrams/AutofillCommandDiagram.pptx
@@ -7,6 +7,7 @@
   <p:sldIdLst>
     <p:sldId id="258" r:id="rId2"/>
     <p:sldId id="259" r:id="rId3"/>
+    <p:sldId id="260" r:id="rId4"/>
   </p:sldIdLst>
   <p:sldSz cx="12192000" cy="6858000"/>
   <p:notesSz cx="6858000" cy="9144000"/>
@@ -262,7 +263,7 @@
           <a:p>
             <a:fld id="{181FA2F3-BF46-4223-8368-B788E003980A}" type="datetimeFigureOut">
               <a:rPr lang="en-SG" smtClean="0"/>
-              <a:t>28/3/2018</a:t>
+              <a:t>9/4/2018</a:t>
             </a:fld>
             <a:endParaRPr lang="en-SG"/>
           </a:p>
@@ -462,7 +463,7 @@
           <a:p>
             <a:fld id="{181FA2F3-BF46-4223-8368-B788E003980A}" type="datetimeFigureOut">
               <a:rPr lang="en-SG" smtClean="0"/>
-              <a:t>28/3/2018</a:t>
+              <a:t>9/4/2018</a:t>
             </a:fld>
             <a:endParaRPr lang="en-SG"/>
           </a:p>
@@ -672,7 +673,7 @@
           <a:p>
             <a:fld id="{181FA2F3-BF46-4223-8368-B788E003980A}" type="datetimeFigureOut">
               <a:rPr lang="en-SG" smtClean="0"/>
-              <a:t>28/3/2018</a:t>
+              <a:t>9/4/2018</a:t>
             </a:fld>
             <a:endParaRPr lang="en-SG"/>
           </a:p>
@@ -872,7 +873,7 @@
           <a:p>
             <a:fld id="{181FA2F3-BF46-4223-8368-B788E003980A}" type="datetimeFigureOut">
               <a:rPr lang="en-SG" smtClean="0"/>
-              <a:t>28/3/2018</a:t>
+              <a:t>9/4/2018</a:t>
             </a:fld>
             <a:endParaRPr lang="en-SG"/>
           </a:p>
@@ -1148,7 +1149,7 @@
           <a:p>
             <a:fld id="{181FA2F3-BF46-4223-8368-B788E003980A}" type="datetimeFigureOut">
               <a:rPr lang="en-SG" smtClean="0"/>
-              <a:t>28/3/2018</a:t>
+              <a:t>9/4/2018</a:t>
             </a:fld>
             <a:endParaRPr lang="en-SG"/>
           </a:p>
@@ -1416,7 +1417,7 @@
           <a:p>
             <a:fld id="{181FA2F3-BF46-4223-8368-B788E003980A}" type="datetimeFigureOut">
               <a:rPr lang="en-SG" smtClean="0"/>
-              <a:t>28/3/2018</a:t>
+              <a:t>9/4/2018</a:t>
             </a:fld>
             <a:endParaRPr lang="en-SG"/>
           </a:p>
@@ -1831,7 +1832,7 @@
           <a:p>
             <a:fld id="{181FA2F3-BF46-4223-8368-B788E003980A}" type="datetimeFigureOut">
               <a:rPr lang="en-SG" smtClean="0"/>
-              <a:t>28/3/2018</a:t>
+              <a:t>9/4/2018</a:t>
             </a:fld>
             <a:endParaRPr lang="en-SG"/>
           </a:p>
@@ -1973,7 +1974,7 @@
           <a:p>
             <a:fld id="{181FA2F3-BF46-4223-8368-B788E003980A}" type="datetimeFigureOut">
               <a:rPr lang="en-SG" smtClean="0"/>
-              <a:t>28/3/2018</a:t>
+              <a:t>9/4/2018</a:t>
             </a:fld>
             <a:endParaRPr lang="en-SG"/>
           </a:p>
@@ -2086,7 +2087,7 @@
           <a:p>
             <a:fld id="{181FA2F3-BF46-4223-8368-B788E003980A}" type="datetimeFigureOut">
               <a:rPr lang="en-SG" smtClean="0"/>
-              <a:t>28/3/2018</a:t>
+              <a:t>9/4/2018</a:t>
             </a:fld>
             <a:endParaRPr lang="en-SG"/>
           </a:p>
@@ -2399,7 +2400,7 @@
           <a:p>
             <a:fld id="{181FA2F3-BF46-4223-8368-B788E003980A}" type="datetimeFigureOut">
               <a:rPr lang="en-SG" smtClean="0"/>
-              <a:t>28/3/2018</a:t>
+              <a:t>9/4/2018</a:t>
             </a:fld>
             <a:endParaRPr lang="en-SG"/>
           </a:p>
@@ -2688,7 +2689,7 @@
           <a:p>
             <a:fld id="{181FA2F3-BF46-4223-8368-B788E003980A}" type="datetimeFigureOut">
               <a:rPr lang="en-SG" smtClean="0"/>
-              <a:t>28/3/2018</a:t>
+              <a:t>9/4/2018</a:t>
             </a:fld>
             <a:endParaRPr lang="en-SG"/>
           </a:p>
@@ -2931,7 +2932,7 @@
           <a:p>
             <a:fld id="{181FA2F3-BF46-4223-8368-B788E003980A}" type="datetimeFigureOut">
               <a:rPr lang="en-SG" smtClean="0"/>
-              <a:t>28/3/2018</a:t>
+              <a:t>9/4/2018</a:t>
             </a:fld>
             <a:endParaRPr lang="en-SG"/>
           </a:p>
@@ -5422,6 +5423,2102 @@
 </p:sld>
 </file>
 
+<file path=ppt/slides/slide3.xml><?xml version="1.0" encoding="utf-8"?>
+<p:sld xmlns:a="http://schemas.openxmlformats.org/drawingml/2006/main" xmlns:r="http://schemas.openxmlformats.org/officeDocument/2006/relationships" xmlns:p="http://schemas.openxmlformats.org/presentationml/2006/main">
+  <p:cSld>
+    <p:spTree>
+      <p:nvGrpSpPr>
+        <p:cNvPr id="1" name=""/>
+        <p:cNvGrpSpPr/>
+        <p:nvPr/>
+      </p:nvGrpSpPr>
+      <p:grpSpPr>
+        <a:xfrm>
+          <a:off x="0" y="0"/>
+          <a:ext cx="0" cy="0"/>
+          <a:chOff x="0" y="0"/>
+          <a:chExt cx="0" cy="0"/>
+        </a:xfrm>
+      </p:grpSpPr>
+      <p:grpSp>
+        <p:nvGrpSpPr>
+          <p:cNvPr id="8" name="Group 7">
+            <a:extLst>
+              <a:ext uri="{FF2B5EF4-FFF2-40B4-BE49-F238E27FC236}">
+                <a16:creationId xmlns:a16="http://schemas.microsoft.com/office/drawing/2014/main" id="{35DB0F50-EAE5-467D-8D99-EE72E165A814}"/>
+              </a:ext>
+            </a:extLst>
+          </p:cNvPr>
+          <p:cNvGrpSpPr/>
+          <p:nvPr/>
+        </p:nvGrpSpPr>
+        <p:grpSpPr>
+          <a:xfrm>
+            <a:off x="3411509" y="615532"/>
+            <a:ext cx="4574924" cy="851066"/>
+            <a:chOff x="3639264" y="3396181"/>
+            <a:chExt cx="4574924" cy="851066"/>
+          </a:xfrm>
+        </p:grpSpPr>
+        <p:grpSp>
+          <p:nvGrpSpPr>
+            <p:cNvPr id="19" name="Group 18">
+              <a:extLst>
+                <a:ext uri="{FF2B5EF4-FFF2-40B4-BE49-F238E27FC236}">
+                  <a16:creationId xmlns:a16="http://schemas.microsoft.com/office/drawing/2014/main" id="{5243E5ED-5006-45A8-81DA-52C84B7E4D11}"/>
+                </a:ext>
+              </a:extLst>
+            </p:cNvPr>
+            <p:cNvGrpSpPr/>
+            <p:nvPr/>
+          </p:nvGrpSpPr>
+          <p:grpSpPr>
+            <a:xfrm>
+              <a:off x="4857758" y="3396181"/>
+              <a:ext cx="1908692" cy="842403"/>
+              <a:chOff x="4775502" y="809624"/>
+              <a:chExt cx="1908692" cy="842403"/>
+            </a:xfrm>
+          </p:grpSpPr>
+          <p:sp>
+            <p:nvSpPr>
+              <p:cNvPr id="11" name="TextBox 10">
+                <a:extLst>
+                  <a:ext uri="{FF2B5EF4-FFF2-40B4-BE49-F238E27FC236}">
+                    <a16:creationId xmlns:a16="http://schemas.microsoft.com/office/drawing/2014/main" id="{7A5CB6A4-B4B0-44C8-9B24-406C6DCE4CDE}"/>
+                  </a:ext>
+                </a:extLst>
+              </p:cNvPr>
+              <p:cNvSpPr txBox="1"/>
+              <p:nvPr/>
+            </p:nvSpPr>
+            <p:spPr>
+              <a:xfrm>
+                <a:off x="4917742" y="827371"/>
+                <a:ext cx="697583" cy="369332"/>
+              </a:xfrm>
+              <a:prstGeom prst="rect">
+                <a:avLst/>
+              </a:prstGeom>
+              <a:noFill/>
+            </p:spPr>
+            <p:txBody>
+              <a:bodyPr wrap="square" rtlCol="0">
+                <a:spAutoFit/>
+              </a:bodyPr>
+              <a:lstStyle/>
+              <a:p>
+                <a:r>
+                  <a:rPr lang="en-SG" dirty="0"/>
+                  <a:t>Press</a:t>
+                </a:r>
+              </a:p>
+            </p:txBody>
+          </p:sp>
+          <p:grpSp>
+            <p:nvGrpSpPr>
+              <p:cNvPr id="14" name="Group 13">
+                <a:extLst>
+                  <a:ext uri="{FF2B5EF4-FFF2-40B4-BE49-F238E27FC236}">
+                    <a16:creationId xmlns:a16="http://schemas.microsoft.com/office/drawing/2014/main" id="{52DC0776-C7D0-446C-9E47-B55D9D94E81C}"/>
+                  </a:ext>
+                </a:extLst>
+              </p:cNvPr>
+              <p:cNvGrpSpPr/>
+              <p:nvPr/>
+            </p:nvGrpSpPr>
+            <p:grpSpPr>
+              <a:xfrm>
+                <a:off x="5628186" y="809624"/>
+                <a:ext cx="665161" cy="369332"/>
+                <a:chOff x="5487401" y="1855555"/>
+                <a:chExt cx="665161" cy="369332"/>
+              </a:xfrm>
+            </p:grpSpPr>
+            <p:sp>
+              <p:nvSpPr>
+                <p:cNvPr id="12" name="Rectangle 11">
+                  <a:extLst>
+                    <a:ext uri="{FF2B5EF4-FFF2-40B4-BE49-F238E27FC236}">
+                      <a16:creationId xmlns:a16="http://schemas.microsoft.com/office/drawing/2014/main" id="{3C0FFBD2-FA58-4887-A4A2-5D09D8C6BDEA}"/>
+                    </a:ext>
+                  </a:extLst>
+                </p:cNvPr>
+                <p:cNvSpPr/>
+                <p:nvPr/>
+              </p:nvSpPr>
+              <p:spPr>
+                <a:xfrm>
+                  <a:off x="5487401" y="1919329"/>
+                  <a:ext cx="608599" cy="277278"/>
+                </a:xfrm>
+                <a:prstGeom prst="rect">
+                  <a:avLst/>
+                </a:prstGeom>
+                <a:ln>
+                  <a:noFill/>
+                </a:ln>
+                <a:effectLst>
+                  <a:outerShdw blurRad="107950" dist="12700" dir="5400000" algn="ctr">
+                    <a:srgbClr val="000000"/>
+                  </a:outerShdw>
+                </a:effectLst>
+                <a:scene3d>
+                  <a:camera prst="orthographicFront">
+                    <a:rot lat="0" lon="0" rev="0"/>
+                  </a:camera>
+                  <a:lightRig rig="soft" dir="t">
+                    <a:rot lat="0" lon="0" rev="0"/>
+                  </a:lightRig>
+                </a:scene3d>
+                <a:sp3d contourW="44450" prstMaterial="matte">
+                  <a:bevelT w="63500" h="63500" prst="artDeco"/>
+                  <a:contourClr>
+                    <a:srgbClr val="FFFFFF"/>
+                  </a:contourClr>
+                </a:sp3d>
+              </p:spPr>
+              <p:style>
+                <a:lnRef idx="2">
+                  <a:schemeClr val="dk1"/>
+                </a:lnRef>
+                <a:fillRef idx="1">
+                  <a:schemeClr val="lt1"/>
+                </a:fillRef>
+                <a:effectRef idx="0">
+                  <a:schemeClr val="dk1"/>
+                </a:effectRef>
+                <a:fontRef idx="minor">
+                  <a:schemeClr val="dk1"/>
+                </a:fontRef>
+              </p:style>
+              <p:txBody>
+                <a:bodyPr rtlCol="0" anchor="ctr"/>
+                <a:lstStyle/>
+                <a:p>
+                  <a:pPr algn="ctr"/>
+                  <a:endParaRPr lang="en-SG"/>
+                </a:p>
+              </p:txBody>
+            </p:sp>
+            <p:sp>
+              <p:nvSpPr>
+                <p:cNvPr id="13" name="TextBox 12">
+                  <a:extLst>
+                    <a:ext uri="{FF2B5EF4-FFF2-40B4-BE49-F238E27FC236}">
+                      <a16:creationId xmlns:a16="http://schemas.microsoft.com/office/drawing/2014/main" id="{99416ED0-FAF5-40B3-AB54-F7283173CFCA}"/>
+                    </a:ext>
+                  </a:extLst>
+                </p:cNvPr>
+                <p:cNvSpPr txBox="1"/>
+                <p:nvPr/>
+              </p:nvSpPr>
+              <p:spPr>
+                <a:xfrm>
+                  <a:off x="5544553" y="1855555"/>
+                  <a:ext cx="608009" cy="369332"/>
+                </a:xfrm>
+                <a:prstGeom prst="rect">
+                  <a:avLst/>
+                </a:prstGeom>
+                <a:noFill/>
+              </p:spPr>
+              <p:txBody>
+                <a:bodyPr wrap="square" rtlCol="0">
+                  <a:spAutoFit/>
+                </a:bodyPr>
+                <a:lstStyle/>
+                <a:p>
+                  <a:r>
+                    <a:rPr lang="en-SG" dirty="0"/>
+                    <a:t>Tab</a:t>
+                  </a:r>
+                </a:p>
+              </p:txBody>
+            </p:sp>
+          </p:grpSp>
+          <p:sp>
+            <p:nvSpPr>
+              <p:cNvPr id="28" name="Arrow: Right 27">
+                <a:extLst>
+                  <a:ext uri="{FF2B5EF4-FFF2-40B4-BE49-F238E27FC236}">
+                    <a16:creationId xmlns:a16="http://schemas.microsoft.com/office/drawing/2014/main" id="{04C2CCCD-DF08-432C-834E-0170D56523AC}"/>
+                  </a:ext>
+                </a:extLst>
+              </p:cNvPr>
+              <p:cNvSpPr/>
+              <p:nvPr/>
+            </p:nvSpPr>
+            <p:spPr>
+              <a:xfrm>
+                <a:off x="4775502" y="1135178"/>
+                <a:ext cx="1908692" cy="516849"/>
+              </a:xfrm>
+              <a:prstGeom prst="rightArrow">
+                <a:avLst>
+                  <a:gd name="adj1" fmla="val 46352"/>
+                  <a:gd name="adj2" fmla="val 50000"/>
+                </a:avLst>
+              </a:prstGeom>
+            </p:spPr>
+            <p:style>
+              <a:lnRef idx="2">
+                <a:schemeClr val="accent1">
+                  <a:shade val="50000"/>
+                </a:schemeClr>
+              </a:lnRef>
+              <a:fillRef idx="1">
+                <a:schemeClr val="accent1"/>
+              </a:fillRef>
+              <a:effectRef idx="0">
+                <a:schemeClr val="accent1"/>
+              </a:effectRef>
+              <a:fontRef idx="minor">
+                <a:schemeClr val="lt1"/>
+              </a:fontRef>
+            </p:style>
+            <p:txBody>
+              <a:bodyPr rtlCol="0" anchor="ctr"/>
+              <a:lstStyle/>
+              <a:p>
+                <a:pPr algn="ctr"/>
+                <a:endParaRPr lang="en-SG"/>
+              </a:p>
+            </p:txBody>
+          </p:sp>
+        </p:grpSp>
+        <p:pic>
+          <p:nvPicPr>
+            <p:cNvPr id="4" name="Picture 3">
+              <a:extLst>
+                <a:ext uri="{FF2B5EF4-FFF2-40B4-BE49-F238E27FC236}">
+                  <a16:creationId xmlns:a16="http://schemas.microsoft.com/office/drawing/2014/main" id="{7AD8FADF-ECAF-479E-8F70-B7E8166BAFCD}"/>
+                </a:ext>
+              </a:extLst>
+            </p:cNvPr>
+            <p:cNvPicPr>
+              <a:picLocks noChangeAspect="1"/>
+            </p:cNvPicPr>
+            <p:nvPr/>
+          </p:nvPicPr>
+          <p:blipFill>
+            <a:blip r:embed="rId2">
+              <a:extLst>
+                <a:ext uri="{28A0092B-C50C-407E-A947-70E740481C1C}">
+                  <a14:useLocalDpi xmlns:a14="http://schemas.microsoft.com/office/drawing/2010/main" val="0"/>
+                </a:ext>
+              </a:extLst>
+            </a:blip>
+            <a:stretch>
+              <a:fillRect/>
+            </a:stretch>
+          </p:blipFill>
+          <p:spPr>
+            <a:xfrm>
+              <a:off x="3639264" y="3737233"/>
+              <a:ext cx="837336" cy="510014"/>
+            </a:xfrm>
+            <a:prstGeom prst="rect">
+              <a:avLst/>
+            </a:prstGeom>
+          </p:spPr>
+        </p:pic>
+        <p:pic>
+          <p:nvPicPr>
+            <p:cNvPr id="7" name="Picture 6">
+              <a:extLst>
+                <a:ext uri="{FF2B5EF4-FFF2-40B4-BE49-F238E27FC236}">
+                  <a16:creationId xmlns:a16="http://schemas.microsoft.com/office/drawing/2014/main" id="{F2EF48E6-BA05-4AC6-983A-5805EA23B2DE}"/>
+                </a:ext>
+              </a:extLst>
+            </p:cNvPr>
+            <p:cNvPicPr>
+              <a:picLocks noChangeAspect="1"/>
+            </p:cNvPicPr>
+            <p:nvPr/>
+          </p:nvPicPr>
+          <p:blipFill>
+            <a:blip r:embed="rId3">
+              <a:extLst>
+                <a:ext uri="{28A0092B-C50C-407E-A947-70E740481C1C}">
+                  <a14:useLocalDpi xmlns:a14="http://schemas.microsoft.com/office/drawing/2010/main" val="0"/>
+                </a:ext>
+              </a:extLst>
+            </a:blip>
+            <a:stretch>
+              <a:fillRect/>
+            </a:stretch>
+          </p:blipFill>
+          <p:spPr>
+            <a:xfrm>
+              <a:off x="7040370" y="3708473"/>
+              <a:ext cx="1173818" cy="530111"/>
+            </a:xfrm>
+            <a:prstGeom prst="rect">
+              <a:avLst/>
+            </a:prstGeom>
+          </p:spPr>
+        </p:pic>
+      </p:grpSp>
+      <p:grpSp>
+        <p:nvGrpSpPr>
+          <p:cNvPr id="93" name="Group 92">
+            <a:extLst>
+              <a:ext uri="{FF2B5EF4-FFF2-40B4-BE49-F238E27FC236}">
+                <a16:creationId xmlns:a16="http://schemas.microsoft.com/office/drawing/2014/main" id="{BDB65010-F056-4CEA-AAD6-C66ED34915DF}"/>
+              </a:ext>
+            </a:extLst>
+          </p:cNvPr>
+          <p:cNvGrpSpPr/>
+          <p:nvPr/>
+        </p:nvGrpSpPr>
+        <p:grpSpPr>
+          <a:xfrm>
+            <a:off x="1821673" y="3360428"/>
+            <a:ext cx="8199753" cy="860223"/>
+            <a:chOff x="1821673" y="3243261"/>
+            <a:chExt cx="8199753" cy="860223"/>
+          </a:xfrm>
+        </p:grpSpPr>
+        <p:grpSp>
+          <p:nvGrpSpPr>
+            <p:cNvPr id="20" name="Group 19">
+              <a:extLst>
+                <a:ext uri="{FF2B5EF4-FFF2-40B4-BE49-F238E27FC236}">
+                  <a16:creationId xmlns:a16="http://schemas.microsoft.com/office/drawing/2014/main" id="{986BA606-97F7-4851-8A54-3DA5FD886401}"/>
+                </a:ext>
+              </a:extLst>
+            </p:cNvPr>
+            <p:cNvGrpSpPr/>
+            <p:nvPr/>
+          </p:nvGrpSpPr>
+          <p:grpSpPr>
+            <a:xfrm>
+              <a:off x="2834511" y="3243261"/>
+              <a:ext cx="1908692" cy="842403"/>
+              <a:chOff x="4775502" y="2861787"/>
+              <a:chExt cx="1908692" cy="842403"/>
+            </a:xfrm>
+          </p:grpSpPr>
+          <p:sp>
+            <p:nvSpPr>
+              <p:cNvPr id="43" name="TextBox 42">
+                <a:extLst>
+                  <a:ext uri="{FF2B5EF4-FFF2-40B4-BE49-F238E27FC236}">
+                    <a16:creationId xmlns:a16="http://schemas.microsoft.com/office/drawing/2014/main" id="{12CAC678-D960-4F53-98ED-13359ACC4653}"/>
+                  </a:ext>
+                </a:extLst>
+              </p:cNvPr>
+              <p:cNvSpPr txBox="1"/>
+              <p:nvPr/>
+            </p:nvSpPr>
+            <p:spPr>
+              <a:xfrm>
+                <a:off x="4917742" y="2879534"/>
+                <a:ext cx="697583" cy="369332"/>
+              </a:xfrm>
+              <a:prstGeom prst="rect">
+                <a:avLst/>
+              </a:prstGeom>
+              <a:noFill/>
+            </p:spPr>
+            <p:txBody>
+              <a:bodyPr wrap="square" rtlCol="0">
+                <a:spAutoFit/>
+              </a:bodyPr>
+              <a:lstStyle/>
+              <a:p>
+                <a:r>
+                  <a:rPr lang="en-SG" dirty="0"/>
+                  <a:t>Press</a:t>
+                </a:r>
+              </a:p>
+            </p:txBody>
+          </p:sp>
+          <p:grpSp>
+            <p:nvGrpSpPr>
+              <p:cNvPr id="44" name="Group 43">
+                <a:extLst>
+                  <a:ext uri="{FF2B5EF4-FFF2-40B4-BE49-F238E27FC236}">
+                    <a16:creationId xmlns:a16="http://schemas.microsoft.com/office/drawing/2014/main" id="{DB4BEC0F-E5E0-4BAD-A8D1-882B99D3E9EC}"/>
+                  </a:ext>
+                </a:extLst>
+              </p:cNvPr>
+              <p:cNvGrpSpPr/>
+              <p:nvPr/>
+            </p:nvGrpSpPr>
+            <p:grpSpPr>
+              <a:xfrm>
+                <a:off x="5628186" y="2861787"/>
+                <a:ext cx="665161" cy="369332"/>
+                <a:chOff x="5487401" y="1855555"/>
+                <a:chExt cx="665161" cy="369332"/>
+              </a:xfrm>
+            </p:grpSpPr>
+            <p:sp>
+              <p:nvSpPr>
+                <p:cNvPr id="45" name="Rectangle 44">
+                  <a:extLst>
+                    <a:ext uri="{FF2B5EF4-FFF2-40B4-BE49-F238E27FC236}">
+                      <a16:creationId xmlns:a16="http://schemas.microsoft.com/office/drawing/2014/main" id="{00DE919B-3607-4984-A729-8E4E21DC366A}"/>
+                    </a:ext>
+                  </a:extLst>
+                </p:cNvPr>
+                <p:cNvSpPr/>
+                <p:nvPr/>
+              </p:nvSpPr>
+              <p:spPr>
+                <a:xfrm>
+                  <a:off x="5487401" y="1919329"/>
+                  <a:ext cx="608599" cy="277278"/>
+                </a:xfrm>
+                <a:prstGeom prst="rect">
+                  <a:avLst/>
+                </a:prstGeom>
+                <a:ln>
+                  <a:noFill/>
+                </a:ln>
+                <a:effectLst>
+                  <a:outerShdw blurRad="107950" dist="12700" dir="5400000" algn="ctr">
+                    <a:srgbClr val="000000"/>
+                  </a:outerShdw>
+                </a:effectLst>
+                <a:scene3d>
+                  <a:camera prst="orthographicFront">
+                    <a:rot lat="0" lon="0" rev="0"/>
+                  </a:camera>
+                  <a:lightRig rig="soft" dir="t">
+                    <a:rot lat="0" lon="0" rev="0"/>
+                  </a:lightRig>
+                </a:scene3d>
+                <a:sp3d contourW="44450" prstMaterial="matte">
+                  <a:bevelT w="63500" h="63500" prst="artDeco"/>
+                  <a:contourClr>
+                    <a:srgbClr val="FFFFFF"/>
+                  </a:contourClr>
+                </a:sp3d>
+              </p:spPr>
+              <p:style>
+                <a:lnRef idx="2">
+                  <a:schemeClr val="dk1"/>
+                </a:lnRef>
+                <a:fillRef idx="1">
+                  <a:schemeClr val="lt1"/>
+                </a:fillRef>
+                <a:effectRef idx="0">
+                  <a:schemeClr val="dk1"/>
+                </a:effectRef>
+                <a:fontRef idx="minor">
+                  <a:schemeClr val="dk1"/>
+                </a:fontRef>
+              </p:style>
+              <p:txBody>
+                <a:bodyPr rtlCol="0" anchor="ctr"/>
+                <a:lstStyle/>
+                <a:p>
+                  <a:pPr algn="ctr"/>
+                  <a:endParaRPr lang="en-SG"/>
+                </a:p>
+              </p:txBody>
+            </p:sp>
+            <p:sp>
+              <p:nvSpPr>
+                <p:cNvPr id="46" name="TextBox 45">
+                  <a:extLst>
+                    <a:ext uri="{FF2B5EF4-FFF2-40B4-BE49-F238E27FC236}">
+                      <a16:creationId xmlns:a16="http://schemas.microsoft.com/office/drawing/2014/main" id="{E71B959C-6F01-49DD-A279-03DE3BEFB01F}"/>
+                    </a:ext>
+                  </a:extLst>
+                </p:cNvPr>
+                <p:cNvSpPr txBox="1"/>
+                <p:nvPr/>
+              </p:nvSpPr>
+              <p:spPr>
+                <a:xfrm>
+                  <a:off x="5544553" y="1855555"/>
+                  <a:ext cx="608009" cy="369332"/>
+                </a:xfrm>
+                <a:prstGeom prst="rect">
+                  <a:avLst/>
+                </a:prstGeom>
+                <a:noFill/>
+              </p:spPr>
+              <p:txBody>
+                <a:bodyPr wrap="square" rtlCol="0">
+                  <a:spAutoFit/>
+                </a:bodyPr>
+                <a:lstStyle/>
+                <a:p>
+                  <a:r>
+                    <a:rPr lang="en-SG" dirty="0"/>
+                    <a:t>Tab</a:t>
+                  </a:r>
+                </a:p>
+              </p:txBody>
+            </p:sp>
+          </p:grpSp>
+          <p:sp>
+            <p:nvSpPr>
+              <p:cNvPr id="47" name="Arrow: Right 46">
+                <a:extLst>
+                  <a:ext uri="{FF2B5EF4-FFF2-40B4-BE49-F238E27FC236}">
+                    <a16:creationId xmlns:a16="http://schemas.microsoft.com/office/drawing/2014/main" id="{A28EB64A-9ACA-4503-AA90-DCC6BA7A9499}"/>
+                  </a:ext>
+                </a:extLst>
+              </p:cNvPr>
+              <p:cNvSpPr/>
+              <p:nvPr/>
+            </p:nvSpPr>
+            <p:spPr>
+              <a:xfrm>
+                <a:off x="4775502" y="3187341"/>
+                <a:ext cx="1908692" cy="516849"/>
+              </a:xfrm>
+              <a:prstGeom prst="rightArrow">
+                <a:avLst>
+                  <a:gd name="adj1" fmla="val 46352"/>
+                  <a:gd name="adj2" fmla="val 50000"/>
+                </a:avLst>
+              </a:prstGeom>
+            </p:spPr>
+            <p:style>
+              <a:lnRef idx="2">
+                <a:schemeClr val="accent1">
+                  <a:shade val="50000"/>
+                </a:schemeClr>
+              </a:lnRef>
+              <a:fillRef idx="1">
+                <a:schemeClr val="accent1"/>
+              </a:fillRef>
+              <a:effectRef idx="0">
+                <a:schemeClr val="accent1"/>
+              </a:effectRef>
+              <a:fontRef idx="minor">
+                <a:schemeClr val="lt1"/>
+              </a:fontRef>
+            </p:style>
+            <p:txBody>
+              <a:bodyPr rtlCol="0" anchor="ctr"/>
+              <a:lstStyle/>
+              <a:p>
+                <a:pPr algn="ctr"/>
+                <a:endParaRPr lang="en-SG"/>
+              </a:p>
+            </p:txBody>
+          </p:sp>
+        </p:grpSp>
+        <p:grpSp>
+          <p:nvGrpSpPr>
+            <p:cNvPr id="48" name="Group 47">
+              <a:extLst>
+                <a:ext uri="{FF2B5EF4-FFF2-40B4-BE49-F238E27FC236}">
+                  <a16:creationId xmlns:a16="http://schemas.microsoft.com/office/drawing/2014/main" id="{AA1106C0-982E-4621-AF24-2844F809BEC9}"/>
+                </a:ext>
+              </a:extLst>
+            </p:cNvPr>
+            <p:cNvGrpSpPr/>
+            <p:nvPr/>
+          </p:nvGrpSpPr>
+          <p:grpSpPr>
+            <a:xfrm>
+              <a:off x="6654739" y="3261008"/>
+              <a:ext cx="1908692" cy="842403"/>
+              <a:chOff x="4775502" y="2861787"/>
+              <a:chExt cx="1908692" cy="842403"/>
+            </a:xfrm>
+          </p:grpSpPr>
+          <p:sp>
+            <p:nvSpPr>
+              <p:cNvPr id="49" name="TextBox 48">
+                <a:extLst>
+                  <a:ext uri="{FF2B5EF4-FFF2-40B4-BE49-F238E27FC236}">
+                    <a16:creationId xmlns:a16="http://schemas.microsoft.com/office/drawing/2014/main" id="{EEF67438-3A04-4E02-85DE-CADB0573DE7C}"/>
+                  </a:ext>
+                </a:extLst>
+              </p:cNvPr>
+              <p:cNvSpPr txBox="1"/>
+              <p:nvPr/>
+            </p:nvSpPr>
+            <p:spPr>
+              <a:xfrm>
+                <a:off x="4917742" y="2879534"/>
+                <a:ext cx="697583" cy="369332"/>
+              </a:xfrm>
+              <a:prstGeom prst="rect">
+                <a:avLst/>
+              </a:prstGeom>
+              <a:noFill/>
+            </p:spPr>
+            <p:txBody>
+              <a:bodyPr wrap="square" rtlCol="0">
+                <a:spAutoFit/>
+              </a:bodyPr>
+              <a:lstStyle/>
+              <a:p>
+                <a:r>
+                  <a:rPr lang="en-SG" dirty="0"/>
+                  <a:t>Press</a:t>
+                </a:r>
+              </a:p>
+            </p:txBody>
+          </p:sp>
+          <p:grpSp>
+            <p:nvGrpSpPr>
+              <p:cNvPr id="50" name="Group 49">
+                <a:extLst>
+                  <a:ext uri="{FF2B5EF4-FFF2-40B4-BE49-F238E27FC236}">
+                    <a16:creationId xmlns:a16="http://schemas.microsoft.com/office/drawing/2014/main" id="{D08898C8-10A5-4F4B-B9FB-61CD6A778B4D}"/>
+                  </a:ext>
+                </a:extLst>
+              </p:cNvPr>
+              <p:cNvGrpSpPr/>
+              <p:nvPr/>
+            </p:nvGrpSpPr>
+            <p:grpSpPr>
+              <a:xfrm>
+                <a:off x="5628186" y="2861787"/>
+                <a:ext cx="665161" cy="369332"/>
+                <a:chOff x="5487401" y="1855555"/>
+                <a:chExt cx="665161" cy="369332"/>
+              </a:xfrm>
+            </p:grpSpPr>
+            <p:sp>
+              <p:nvSpPr>
+                <p:cNvPr id="52" name="Rectangle 51">
+                  <a:extLst>
+                    <a:ext uri="{FF2B5EF4-FFF2-40B4-BE49-F238E27FC236}">
+                      <a16:creationId xmlns:a16="http://schemas.microsoft.com/office/drawing/2014/main" id="{8B1AC194-26E6-4924-964C-63FF1D6055FF}"/>
+                    </a:ext>
+                  </a:extLst>
+                </p:cNvPr>
+                <p:cNvSpPr/>
+                <p:nvPr/>
+              </p:nvSpPr>
+              <p:spPr>
+                <a:xfrm>
+                  <a:off x="5487401" y="1919329"/>
+                  <a:ext cx="608599" cy="277278"/>
+                </a:xfrm>
+                <a:prstGeom prst="rect">
+                  <a:avLst/>
+                </a:prstGeom>
+                <a:ln>
+                  <a:noFill/>
+                </a:ln>
+                <a:effectLst>
+                  <a:outerShdw blurRad="107950" dist="12700" dir="5400000" algn="ctr">
+                    <a:srgbClr val="000000"/>
+                  </a:outerShdw>
+                </a:effectLst>
+                <a:scene3d>
+                  <a:camera prst="orthographicFront">
+                    <a:rot lat="0" lon="0" rev="0"/>
+                  </a:camera>
+                  <a:lightRig rig="soft" dir="t">
+                    <a:rot lat="0" lon="0" rev="0"/>
+                  </a:lightRig>
+                </a:scene3d>
+                <a:sp3d contourW="44450" prstMaterial="matte">
+                  <a:bevelT w="63500" h="63500" prst="artDeco"/>
+                  <a:contourClr>
+                    <a:srgbClr val="FFFFFF"/>
+                  </a:contourClr>
+                </a:sp3d>
+              </p:spPr>
+              <p:style>
+                <a:lnRef idx="2">
+                  <a:schemeClr val="dk1"/>
+                </a:lnRef>
+                <a:fillRef idx="1">
+                  <a:schemeClr val="lt1"/>
+                </a:fillRef>
+                <a:effectRef idx="0">
+                  <a:schemeClr val="dk1"/>
+                </a:effectRef>
+                <a:fontRef idx="minor">
+                  <a:schemeClr val="dk1"/>
+                </a:fontRef>
+              </p:style>
+              <p:txBody>
+                <a:bodyPr rtlCol="0" anchor="ctr"/>
+                <a:lstStyle/>
+                <a:p>
+                  <a:pPr algn="ctr"/>
+                  <a:endParaRPr lang="en-SG"/>
+                </a:p>
+              </p:txBody>
+            </p:sp>
+            <p:sp>
+              <p:nvSpPr>
+                <p:cNvPr id="53" name="TextBox 52">
+                  <a:extLst>
+                    <a:ext uri="{FF2B5EF4-FFF2-40B4-BE49-F238E27FC236}">
+                      <a16:creationId xmlns:a16="http://schemas.microsoft.com/office/drawing/2014/main" id="{0A662AB0-6F06-48A8-94C6-C15DC4B4AE19}"/>
+                    </a:ext>
+                  </a:extLst>
+                </p:cNvPr>
+                <p:cNvSpPr txBox="1"/>
+                <p:nvPr/>
+              </p:nvSpPr>
+              <p:spPr>
+                <a:xfrm>
+                  <a:off x="5544553" y="1855555"/>
+                  <a:ext cx="608009" cy="369332"/>
+                </a:xfrm>
+                <a:prstGeom prst="rect">
+                  <a:avLst/>
+                </a:prstGeom>
+                <a:noFill/>
+              </p:spPr>
+              <p:txBody>
+                <a:bodyPr wrap="square" rtlCol="0">
+                  <a:spAutoFit/>
+                </a:bodyPr>
+                <a:lstStyle/>
+                <a:p>
+                  <a:r>
+                    <a:rPr lang="en-SG" dirty="0"/>
+                    <a:t>Tab</a:t>
+                  </a:r>
+                </a:p>
+              </p:txBody>
+            </p:sp>
+          </p:grpSp>
+          <p:sp>
+            <p:nvSpPr>
+              <p:cNvPr id="51" name="Arrow: Right 50">
+                <a:extLst>
+                  <a:ext uri="{FF2B5EF4-FFF2-40B4-BE49-F238E27FC236}">
+                    <a16:creationId xmlns:a16="http://schemas.microsoft.com/office/drawing/2014/main" id="{04BC68E3-FEAF-4E17-A1C8-C6C330652B43}"/>
+                  </a:ext>
+                </a:extLst>
+              </p:cNvPr>
+              <p:cNvSpPr/>
+              <p:nvPr/>
+            </p:nvSpPr>
+            <p:spPr>
+              <a:xfrm>
+                <a:off x="4775502" y="3187341"/>
+                <a:ext cx="1908692" cy="516849"/>
+              </a:xfrm>
+              <a:prstGeom prst="rightArrow">
+                <a:avLst>
+                  <a:gd name="adj1" fmla="val 46352"/>
+                  <a:gd name="adj2" fmla="val 50000"/>
+                </a:avLst>
+              </a:prstGeom>
+            </p:spPr>
+            <p:style>
+              <a:lnRef idx="2">
+                <a:schemeClr val="accent1">
+                  <a:shade val="50000"/>
+                </a:schemeClr>
+              </a:lnRef>
+              <a:fillRef idx="1">
+                <a:schemeClr val="accent1"/>
+              </a:fillRef>
+              <a:effectRef idx="0">
+                <a:schemeClr val="accent1"/>
+              </a:effectRef>
+              <a:fontRef idx="minor">
+                <a:schemeClr val="lt1"/>
+              </a:fontRef>
+            </p:style>
+            <p:txBody>
+              <a:bodyPr rtlCol="0" anchor="ctr"/>
+              <a:lstStyle/>
+              <a:p>
+                <a:pPr algn="ctr"/>
+                <a:endParaRPr lang="en-SG"/>
+              </a:p>
+            </p:txBody>
+          </p:sp>
+        </p:grpSp>
+        <p:pic>
+          <p:nvPicPr>
+            <p:cNvPr id="40" name="Picture 39">
+              <a:extLst>
+                <a:ext uri="{FF2B5EF4-FFF2-40B4-BE49-F238E27FC236}">
+                  <a16:creationId xmlns:a16="http://schemas.microsoft.com/office/drawing/2014/main" id="{E71D4AA0-14D5-4065-8EC7-B83AC2C5DD12}"/>
+                </a:ext>
+              </a:extLst>
+            </p:cNvPr>
+            <p:cNvPicPr>
+              <a:picLocks noChangeAspect="1"/>
+            </p:cNvPicPr>
+            <p:nvPr/>
+          </p:nvPicPr>
+          <p:blipFill>
+            <a:blip r:embed="rId4">
+              <a:extLst>
+                <a:ext uri="{28A0092B-C50C-407E-A947-70E740481C1C}">
+                  <a14:useLocalDpi xmlns:a14="http://schemas.microsoft.com/office/drawing/2010/main" val="0"/>
+                </a:ext>
+              </a:extLst>
+            </a:blip>
+            <a:stretch>
+              <a:fillRect/>
+            </a:stretch>
+          </p:blipFill>
+          <p:spPr>
+            <a:xfrm>
+              <a:off x="1821673" y="3566515"/>
+              <a:ext cx="622953" cy="533960"/>
+            </a:xfrm>
+            <a:prstGeom prst="rect">
+              <a:avLst/>
+            </a:prstGeom>
+          </p:spPr>
+        </p:pic>
+        <p:pic>
+          <p:nvPicPr>
+            <p:cNvPr id="42" name="Picture 41">
+              <a:extLst>
+                <a:ext uri="{FF2B5EF4-FFF2-40B4-BE49-F238E27FC236}">
+                  <a16:creationId xmlns:a16="http://schemas.microsoft.com/office/drawing/2014/main" id="{B5E536ED-2B75-4657-B913-2C228149C9FE}"/>
+                </a:ext>
+              </a:extLst>
+            </p:cNvPr>
+            <p:cNvPicPr>
+              <a:picLocks noChangeAspect="1"/>
+            </p:cNvPicPr>
+            <p:nvPr/>
+          </p:nvPicPr>
+          <p:blipFill>
+            <a:blip r:embed="rId5">
+              <a:extLst>
+                <a:ext uri="{28A0092B-C50C-407E-A947-70E740481C1C}">
+                  <a14:useLocalDpi xmlns:a14="http://schemas.microsoft.com/office/drawing/2010/main" val="0"/>
+                </a:ext>
+              </a:extLst>
+            </a:blip>
+            <a:stretch>
+              <a:fillRect/>
+            </a:stretch>
+          </p:blipFill>
+          <p:spPr>
+            <a:xfrm>
+              <a:off x="5133089" y="3566515"/>
+              <a:ext cx="1131764" cy="536968"/>
+            </a:xfrm>
+            <a:prstGeom prst="rect">
+              <a:avLst/>
+            </a:prstGeom>
+          </p:spPr>
+        </p:pic>
+        <p:pic>
+          <p:nvPicPr>
+            <p:cNvPr id="55" name="Picture 54">
+              <a:extLst>
+                <a:ext uri="{FF2B5EF4-FFF2-40B4-BE49-F238E27FC236}">
+                  <a16:creationId xmlns:a16="http://schemas.microsoft.com/office/drawing/2014/main" id="{85F55FE1-7786-4D9F-AEAD-7A5B3FC01594}"/>
+                </a:ext>
+              </a:extLst>
+            </p:cNvPr>
+            <p:cNvPicPr>
+              <a:picLocks noChangeAspect="1"/>
+            </p:cNvPicPr>
+            <p:nvPr/>
+          </p:nvPicPr>
+          <p:blipFill rotWithShape="1">
+            <a:blip r:embed="rId6">
+              <a:extLst>
+                <a:ext uri="{28A0092B-C50C-407E-A947-70E740481C1C}">
+                  <a14:useLocalDpi xmlns:a14="http://schemas.microsoft.com/office/drawing/2010/main" val="0"/>
+                </a:ext>
+              </a:extLst>
+            </a:blip>
+            <a:srcRect t="12358"/>
+            <a:stretch/>
+          </p:blipFill>
+          <p:spPr>
+            <a:xfrm>
+              <a:off x="8889662" y="3566515"/>
+              <a:ext cx="1131764" cy="536969"/>
+            </a:xfrm>
+            <a:prstGeom prst="rect">
+              <a:avLst/>
+            </a:prstGeom>
+          </p:spPr>
+        </p:pic>
+      </p:grpSp>
+      <p:grpSp>
+        <p:nvGrpSpPr>
+          <p:cNvPr id="56" name="Group 55">
+            <a:extLst>
+              <a:ext uri="{FF2B5EF4-FFF2-40B4-BE49-F238E27FC236}">
+                <a16:creationId xmlns:a16="http://schemas.microsoft.com/office/drawing/2014/main" id="{9E764F42-259C-47C8-8C33-0F73C3AB9E7F}"/>
+              </a:ext>
+            </a:extLst>
+          </p:cNvPr>
+          <p:cNvGrpSpPr/>
+          <p:nvPr/>
+        </p:nvGrpSpPr>
+        <p:grpSpPr>
+          <a:xfrm>
+            <a:off x="1812313" y="1954808"/>
+            <a:ext cx="8243398" cy="843038"/>
+            <a:chOff x="1812313" y="4998450"/>
+            <a:chExt cx="8243398" cy="843038"/>
+          </a:xfrm>
+        </p:grpSpPr>
+        <p:grpSp>
+          <p:nvGrpSpPr>
+            <p:cNvPr id="57" name="Group 56">
+              <a:extLst>
+                <a:ext uri="{FF2B5EF4-FFF2-40B4-BE49-F238E27FC236}">
+                  <a16:creationId xmlns:a16="http://schemas.microsoft.com/office/drawing/2014/main" id="{AF9777AD-C6DD-4FFC-A4D1-BC793F22BE75}"/>
+                </a:ext>
+              </a:extLst>
+            </p:cNvPr>
+            <p:cNvGrpSpPr/>
+            <p:nvPr/>
+          </p:nvGrpSpPr>
+          <p:grpSpPr>
+            <a:xfrm>
+              <a:off x="2881278" y="4998450"/>
+              <a:ext cx="1908692" cy="842403"/>
+              <a:chOff x="4775502" y="2861787"/>
+              <a:chExt cx="1908692" cy="842403"/>
+            </a:xfrm>
+          </p:grpSpPr>
+          <p:sp>
+            <p:nvSpPr>
+              <p:cNvPr id="67" name="TextBox 66">
+                <a:extLst>
+                  <a:ext uri="{FF2B5EF4-FFF2-40B4-BE49-F238E27FC236}">
+                    <a16:creationId xmlns:a16="http://schemas.microsoft.com/office/drawing/2014/main" id="{2C1A84CF-68B7-40F8-AC21-16A2FCE31382}"/>
+                  </a:ext>
+                </a:extLst>
+              </p:cNvPr>
+              <p:cNvSpPr txBox="1"/>
+              <p:nvPr/>
+            </p:nvSpPr>
+            <p:spPr>
+              <a:xfrm>
+                <a:off x="4917742" y="2879534"/>
+                <a:ext cx="697583" cy="369332"/>
+              </a:xfrm>
+              <a:prstGeom prst="rect">
+                <a:avLst/>
+              </a:prstGeom>
+              <a:noFill/>
+            </p:spPr>
+            <p:txBody>
+              <a:bodyPr wrap="square" rtlCol="0">
+                <a:spAutoFit/>
+              </a:bodyPr>
+              <a:lstStyle/>
+              <a:p>
+                <a:r>
+                  <a:rPr lang="en-SG" dirty="0"/>
+                  <a:t>Press</a:t>
+                </a:r>
+              </a:p>
+            </p:txBody>
+          </p:sp>
+          <p:grpSp>
+            <p:nvGrpSpPr>
+              <p:cNvPr id="68" name="Group 67">
+                <a:extLst>
+                  <a:ext uri="{FF2B5EF4-FFF2-40B4-BE49-F238E27FC236}">
+                    <a16:creationId xmlns:a16="http://schemas.microsoft.com/office/drawing/2014/main" id="{0F724826-C304-4A40-BB37-B63A34C41AF2}"/>
+                  </a:ext>
+                </a:extLst>
+              </p:cNvPr>
+              <p:cNvGrpSpPr/>
+              <p:nvPr/>
+            </p:nvGrpSpPr>
+            <p:grpSpPr>
+              <a:xfrm>
+                <a:off x="5628186" y="2861787"/>
+                <a:ext cx="665161" cy="369332"/>
+                <a:chOff x="5487401" y="1855555"/>
+                <a:chExt cx="665161" cy="369332"/>
+              </a:xfrm>
+            </p:grpSpPr>
+            <p:sp>
+              <p:nvSpPr>
+                <p:cNvPr id="70" name="Rectangle 69">
+                  <a:extLst>
+                    <a:ext uri="{FF2B5EF4-FFF2-40B4-BE49-F238E27FC236}">
+                      <a16:creationId xmlns:a16="http://schemas.microsoft.com/office/drawing/2014/main" id="{FB354342-3260-4F98-8D9A-2298B85C93D6}"/>
+                    </a:ext>
+                  </a:extLst>
+                </p:cNvPr>
+                <p:cNvSpPr/>
+                <p:nvPr/>
+              </p:nvSpPr>
+              <p:spPr>
+                <a:xfrm>
+                  <a:off x="5487401" y="1919329"/>
+                  <a:ext cx="608599" cy="277278"/>
+                </a:xfrm>
+                <a:prstGeom prst="rect">
+                  <a:avLst/>
+                </a:prstGeom>
+                <a:ln>
+                  <a:noFill/>
+                </a:ln>
+                <a:effectLst>
+                  <a:outerShdw blurRad="107950" dist="12700" dir="5400000" algn="ctr">
+                    <a:srgbClr val="000000"/>
+                  </a:outerShdw>
+                </a:effectLst>
+                <a:scene3d>
+                  <a:camera prst="orthographicFront">
+                    <a:rot lat="0" lon="0" rev="0"/>
+                  </a:camera>
+                  <a:lightRig rig="soft" dir="t">
+                    <a:rot lat="0" lon="0" rev="0"/>
+                  </a:lightRig>
+                </a:scene3d>
+                <a:sp3d contourW="44450" prstMaterial="matte">
+                  <a:bevelT w="63500" h="63500" prst="artDeco"/>
+                  <a:contourClr>
+                    <a:srgbClr val="FFFFFF"/>
+                  </a:contourClr>
+                </a:sp3d>
+              </p:spPr>
+              <p:style>
+                <a:lnRef idx="2">
+                  <a:schemeClr val="dk1"/>
+                </a:lnRef>
+                <a:fillRef idx="1">
+                  <a:schemeClr val="lt1"/>
+                </a:fillRef>
+                <a:effectRef idx="0">
+                  <a:schemeClr val="dk1"/>
+                </a:effectRef>
+                <a:fontRef idx="minor">
+                  <a:schemeClr val="dk1"/>
+                </a:fontRef>
+              </p:style>
+              <p:txBody>
+                <a:bodyPr rtlCol="0" anchor="ctr"/>
+                <a:lstStyle/>
+                <a:p>
+                  <a:pPr algn="ctr"/>
+                  <a:endParaRPr lang="en-SG"/>
+                </a:p>
+              </p:txBody>
+            </p:sp>
+            <p:sp>
+              <p:nvSpPr>
+                <p:cNvPr id="71" name="TextBox 70">
+                  <a:extLst>
+                    <a:ext uri="{FF2B5EF4-FFF2-40B4-BE49-F238E27FC236}">
+                      <a16:creationId xmlns:a16="http://schemas.microsoft.com/office/drawing/2014/main" id="{938E59E3-B436-460D-B2BE-E874EE0CB4E8}"/>
+                    </a:ext>
+                  </a:extLst>
+                </p:cNvPr>
+                <p:cNvSpPr txBox="1"/>
+                <p:nvPr/>
+              </p:nvSpPr>
+              <p:spPr>
+                <a:xfrm>
+                  <a:off x="5544553" y="1855555"/>
+                  <a:ext cx="608009" cy="369332"/>
+                </a:xfrm>
+                <a:prstGeom prst="rect">
+                  <a:avLst/>
+                </a:prstGeom>
+                <a:noFill/>
+              </p:spPr>
+              <p:txBody>
+                <a:bodyPr wrap="square" rtlCol="0">
+                  <a:spAutoFit/>
+                </a:bodyPr>
+                <a:lstStyle/>
+                <a:p>
+                  <a:r>
+                    <a:rPr lang="en-SG" dirty="0"/>
+                    <a:t>Tab</a:t>
+                  </a:r>
+                </a:p>
+              </p:txBody>
+            </p:sp>
+          </p:grpSp>
+          <p:sp>
+            <p:nvSpPr>
+              <p:cNvPr id="69" name="Arrow: Right 68">
+                <a:extLst>
+                  <a:ext uri="{FF2B5EF4-FFF2-40B4-BE49-F238E27FC236}">
+                    <a16:creationId xmlns:a16="http://schemas.microsoft.com/office/drawing/2014/main" id="{98F7D9BA-A95A-40C3-8488-38965E536ABF}"/>
+                  </a:ext>
+                </a:extLst>
+              </p:cNvPr>
+              <p:cNvSpPr/>
+              <p:nvPr/>
+            </p:nvSpPr>
+            <p:spPr>
+              <a:xfrm>
+                <a:off x="4775502" y="3187341"/>
+                <a:ext cx="1908692" cy="516849"/>
+              </a:xfrm>
+              <a:prstGeom prst="rightArrow">
+                <a:avLst>
+                  <a:gd name="adj1" fmla="val 46352"/>
+                  <a:gd name="adj2" fmla="val 50000"/>
+                </a:avLst>
+              </a:prstGeom>
+            </p:spPr>
+            <p:style>
+              <a:lnRef idx="2">
+                <a:schemeClr val="accent1">
+                  <a:shade val="50000"/>
+                </a:schemeClr>
+              </a:lnRef>
+              <a:fillRef idx="1">
+                <a:schemeClr val="accent1"/>
+              </a:fillRef>
+              <a:effectRef idx="0">
+                <a:schemeClr val="accent1"/>
+              </a:effectRef>
+              <a:fontRef idx="minor">
+                <a:schemeClr val="lt1"/>
+              </a:fontRef>
+            </p:style>
+            <p:txBody>
+              <a:bodyPr rtlCol="0" anchor="ctr"/>
+              <a:lstStyle/>
+              <a:p>
+                <a:pPr algn="ctr"/>
+                <a:endParaRPr lang="en-SG"/>
+              </a:p>
+            </p:txBody>
+          </p:sp>
+        </p:grpSp>
+        <p:pic>
+          <p:nvPicPr>
+            <p:cNvPr id="58" name="Picture 57">
+              <a:extLst>
+                <a:ext uri="{FF2B5EF4-FFF2-40B4-BE49-F238E27FC236}">
+                  <a16:creationId xmlns:a16="http://schemas.microsoft.com/office/drawing/2014/main" id="{595FEB63-05DA-47E5-B715-37C405449679}"/>
+                </a:ext>
+              </a:extLst>
+            </p:cNvPr>
+            <p:cNvPicPr>
+              <a:picLocks noChangeAspect="1"/>
+            </p:cNvPicPr>
+            <p:nvPr/>
+          </p:nvPicPr>
+          <p:blipFill>
+            <a:blip r:embed="rId7">
+              <a:extLst>
+                <a:ext uri="{28A0092B-C50C-407E-A947-70E740481C1C}">
+                  <a14:useLocalDpi xmlns:a14="http://schemas.microsoft.com/office/drawing/2010/main" val="0"/>
+                </a:ext>
+              </a:extLst>
+            </a:blip>
+            <a:stretch>
+              <a:fillRect/>
+            </a:stretch>
+          </p:blipFill>
+          <p:spPr>
+            <a:xfrm>
+              <a:off x="1812313" y="5302012"/>
+              <a:ext cx="695967" cy="518425"/>
+            </a:xfrm>
+            <a:prstGeom prst="rect">
+              <a:avLst/>
+            </a:prstGeom>
+          </p:spPr>
+        </p:pic>
+        <p:pic>
+          <p:nvPicPr>
+            <p:cNvPr id="59" name="Picture 58">
+              <a:extLst>
+                <a:ext uri="{FF2B5EF4-FFF2-40B4-BE49-F238E27FC236}">
+                  <a16:creationId xmlns:a16="http://schemas.microsoft.com/office/drawing/2014/main" id="{7737C5F7-B4AB-4E10-840D-96CC3CB55801}"/>
+                </a:ext>
+              </a:extLst>
+            </p:cNvPr>
+            <p:cNvPicPr>
+              <a:picLocks noChangeAspect="1"/>
+            </p:cNvPicPr>
+            <p:nvPr/>
+          </p:nvPicPr>
+          <p:blipFill>
+            <a:blip r:embed="rId8">
+              <a:extLst>
+                <a:ext uri="{28A0092B-C50C-407E-A947-70E740481C1C}">
+                  <a14:useLocalDpi xmlns:a14="http://schemas.microsoft.com/office/drawing/2010/main" val="0"/>
+                </a:ext>
+              </a:extLst>
+            </a:blip>
+            <a:stretch>
+              <a:fillRect/>
+            </a:stretch>
+          </p:blipFill>
+          <p:spPr>
+            <a:xfrm>
+              <a:off x="5162968" y="5307082"/>
+              <a:ext cx="1072006" cy="513355"/>
+            </a:xfrm>
+            <a:prstGeom prst="rect">
+              <a:avLst/>
+            </a:prstGeom>
+          </p:spPr>
+        </p:pic>
+        <p:pic>
+          <p:nvPicPr>
+            <p:cNvPr id="60" name="Picture 59">
+              <a:extLst>
+                <a:ext uri="{FF2B5EF4-FFF2-40B4-BE49-F238E27FC236}">
+                  <a16:creationId xmlns:a16="http://schemas.microsoft.com/office/drawing/2014/main" id="{DDB142EB-08A3-46B7-9257-D8F73DB9059F}"/>
+                </a:ext>
+              </a:extLst>
+            </p:cNvPr>
+            <p:cNvPicPr>
+              <a:picLocks noChangeAspect="1"/>
+            </p:cNvPicPr>
+            <p:nvPr/>
+          </p:nvPicPr>
+          <p:blipFill>
+            <a:blip r:embed="rId9">
+              <a:extLst>
+                <a:ext uri="{28A0092B-C50C-407E-A947-70E740481C1C}">
+                  <a14:useLocalDpi xmlns:a14="http://schemas.microsoft.com/office/drawing/2010/main" val="0"/>
+                </a:ext>
+              </a:extLst>
+            </a:blip>
+            <a:stretch>
+              <a:fillRect/>
+            </a:stretch>
+          </p:blipFill>
+          <p:spPr>
+            <a:xfrm>
+              <a:off x="8889662" y="5297918"/>
+              <a:ext cx="1166049" cy="513355"/>
+            </a:xfrm>
+            <a:prstGeom prst="rect">
+              <a:avLst/>
+            </a:prstGeom>
+          </p:spPr>
+        </p:pic>
+        <p:grpSp>
+          <p:nvGrpSpPr>
+            <p:cNvPr id="61" name="Group 60">
+              <a:extLst>
+                <a:ext uri="{FF2B5EF4-FFF2-40B4-BE49-F238E27FC236}">
+                  <a16:creationId xmlns:a16="http://schemas.microsoft.com/office/drawing/2014/main" id="{A5477AAB-12B9-44F8-A2DF-9A6B00487A53}"/>
+                </a:ext>
+              </a:extLst>
+            </p:cNvPr>
+            <p:cNvGrpSpPr/>
+            <p:nvPr/>
+          </p:nvGrpSpPr>
+          <p:grpSpPr>
+            <a:xfrm>
+              <a:off x="6607972" y="4999085"/>
+              <a:ext cx="1908692" cy="842403"/>
+              <a:chOff x="4775502" y="2861787"/>
+              <a:chExt cx="1908692" cy="842403"/>
+            </a:xfrm>
+          </p:grpSpPr>
+          <p:sp>
+            <p:nvSpPr>
+              <p:cNvPr id="62" name="TextBox 61">
+                <a:extLst>
+                  <a:ext uri="{FF2B5EF4-FFF2-40B4-BE49-F238E27FC236}">
+                    <a16:creationId xmlns:a16="http://schemas.microsoft.com/office/drawing/2014/main" id="{DA4478A6-6C44-4C3F-9458-150A0022C141}"/>
+                  </a:ext>
+                </a:extLst>
+              </p:cNvPr>
+              <p:cNvSpPr txBox="1"/>
+              <p:nvPr/>
+            </p:nvSpPr>
+            <p:spPr>
+              <a:xfrm>
+                <a:off x="4917742" y="2879534"/>
+                <a:ext cx="697583" cy="369332"/>
+              </a:xfrm>
+              <a:prstGeom prst="rect">
+                <a:avLst/>
+              </a:prstGeom>
+              <a:noFill/>
+            </p:spPr>
+            <p:txBody>
+              <a:bodyPr wrap="square" rtlCol="0">
+                <a:spAutoFit/>
+              </a:bodyPr>
+              <a:lstStyle/>
+              <a:p>
+                <a:r>
+                  <a:rPr lang="en-SG" dirty="0"/>
+                  <a:t>Press</a:t>
+                </a:r>
+              </a:p>
+            </p:txBody>
+          </p:sp>
+          <p:grpSp>
+            <p:nvGrpSpPr>
+              <p:cNvPr id="63" name="Group 62">
+                <a:extLst>
+                  <a:ext uri="{FF2B5EF4-FFF2-40B4-BE49-F238E27FC236}">
+                    <a16:creationId xmlns:a16="http://schemas.microsoft.com/office/drawing/2014/main" id="{8D2D1D1F-BC31-42ED-AAEA-3149D073D212}"/>
+                  </a:ext>
+                </a:extLst>
+              </p:cNvPr>
+              <p:cNvGrpSpPr/>
+              <p:nvPr/>
+            </p:nvGrpSpPr>
+            <p:grpSpPr>
+              <a:xfrm>
+                <a:off x="5628186" y="2861787"/>
+                <a:ext cx="665161" cy="369332"/>
+                <a:chOff x="5487401" y="1855555"/>
+                <a:chExt cx="665161" cy="369332"/>
+              </a:xfrm>
+            </p:grpSpPr>
+            <p:sp>
+              <p:nvSpPr>
+                <p:cNvPr id="65" name="Rectangle 64">
+                  <a:extLst>
+                    <a:ext uri="{FF2B5EF4-FFF2-40B4-BE49-F238E27FC236}">
+                      <a16:creationId xmlns:a16="http://schemas.microsoft.com/office/drawing/2014/main" id="{2B377C04-1CE4-4709-9151-024ACDE55524}"/>
+                    </a:ext>
+                  </a:extLst>
+                </p:cNvPr>
+                <p:cNvSpPr/>
+                <p:nvPr/>
+              </p:nvSpPr>
+              <p:spPr>
+                <a:xfrm>
+                  <a:off x="5487401" y="1919329"/>
+                  <a:ext cx="608599" cy="277278"/>
+                </a:xfrm>
+                <a:prstGeom prst="rect">
+                  <a:avLst/>
+                </a:prstGeom>
+                <a:ln>
+                  <a:noFill/>
+                </a:ln>
+                <a:effectLst>
+                  <a:outerShdw blurRad="107950" dist="12700" dir="5400000" algn="ctr">
+                    <a:srgbClr val="000000"/>
+                  </a:outerShdw>
+                </a:effectLst>
+                <a:scene3d>
+                  <a:camera prst="orthographicFront">
+                    <a:rot lat="0" lon="0" rev="0"/>
+                  </a:camera>
+                  <a:lightRig rig="soft" dir="t">
+                    <a:rot lat="0" lon="0" rev="0"/>
+                  </a:lightRig>
+                </a:scene3d>
+                <a:sp3d contourW="44450" prstMaterial="matte">
+                  <a:bevelT w="63500" h="63500" prst="artDeco"/>
+                  <a:contourClr>
+                    <a:srgbClr val="FFFFFF"/>
+                  </a:contourClr>
+                </a:sp3d>
+              </p:spPr>
+              <p:style>
+                <a:lnRef idx="2">
+                  <a:schemeClr val="dk1"/>
+                </a:lnRef>
+                <a:fillRef idx="1">
+                  <a:schemeClr val="lt1"/>
+                </a:fillRef>
+                <a:effectRef idx="0">
+                  <a:schemeClr val="dk1"/>
+                </a:effectRef>
+                <a:fontRef idx="minor">
+                  <a:schemeClr val="dk1"/>
+                </a:fontRef>
+              </p:style>
+              <p:txBody>
+                <a:bodyPr rtlCol="0" anchor="ctr"/>
+                <a:lstStyle/>
+                <a:p>
+                  <a:pPr algn="ctr"/>
+                  <a:endParaRPr lang="en-SG"/>
+                </a:p>
+              </p:txBody>
+            </p:sp>
+            <p:sp>
+              <p:nvSpPr>
+                <p:cNvPr id="66" name="TextBox 65">
+                  <a:extLst>
+                    <a:ext uri="{FF2B5EF4-FFF2-40B4-BE49-F238E27FC236}">
+                      <a16:creationId xmlns:a16="http://schemas.microsoft.com/office/drawing/2014/main" id="{77A9C202-0462-446A-8F68-5D8896E380F1}"/>
+                    </a:ext>
+                  </a:extLst>
+                </p:cNvPr>
+                <p:cNvSpPr txBox="1"/>
+                <p:nvPr/>
+              </p:nvSpPr>
+              <p:spPr>
+                <a:xfrm>
+                  <a:off x="5544553" y="1855555"/>
+                  <a:ext cx="608009" cy="369332"/>
+                </a:xfrm>
+                <a:prstGeom prst="rect">
+                  <a:avLst/>
+                </a:prstGeom>
+                <a:noFill/>
+              </p:spPr>
+              <p:txBody>
+                <a:bodyPr wrap="square" rtlCol="0">
+                  <a:spAutoFit/>
+                </a:bodyPr>
+                <a:lstStyle/>
+                <a:p>
+                  <a:r>
+                    <a:rPr lang="en-SG" dirty="0"/>
+                    <a:t>Tab</a:t>
+                  </a:r>
+                </a:p>
+              </p:txBody>
+            </p:sp>
+          </p:grpSp>
+          <p:sp>
+            <p:nvSpPr>
+              <p:cNvPr id="64" name="Arrow: Right 63">
+                <a:extLst>
+                  <a:ext uri="{FF2B5EF4-FFF2-40B4-BE49-F238E27FC236}">
+                    <a16:creationId xmlns:a16="http://schemas.microsoft.com/office/drawing/2014/main" id="{85AC51E7-189E-48BE-AEC0-AB681D035706}"/>
+                  </a:ext>
+                </a:extLst>
+              </p:cNvPr>
+              <p:cNvSpPr/>
+              <p:nvPr/>
+            </p:nvSpPr>
+            <p:spPr>
+              <a:xfrm>
+                <a:off x="4775502" y="3187341"/>
+                <a:ext cx="1908692" cy="516849"/>
+              </a:xfrm>
+              <a:prstGeom prst="rightArrow">
+                <a:avLst>
+                  <a:gd name="adj1" fmla="val 46352"/>
+                  <a:gd name="adj2" fmla="val 50000"/>
+                </a:avLst>
+              </a:prstGeom>
+            </p:spPr>
+            <p:style>
+              <a:lnRef idx="2">
+                <a:schemeClr val="accent1">
+                  <a:shade val="50000"/>
+                </a:schemeClr>
+              </a:lnRef>
+              <a:fillRef idx="1">
+                <a:schemeClr val="accent1"/>
+              </a:fillRef>
+              <a:effectRef idx="0">
+                <a:schemeClr val="accent1"/>
+              </a:effectRef>
+              <a:fontRef idx="minor">
+                <a:schemeClr val="lt1"/>
+              </a:fontRef>
+            </p:style>
+            <p:txBody>
+              <a:bodyPr rtlCol="0" anchor="ctr"/>
+              <a:lstStyle/>
+              <a:p>
+                <a:pPr algn="ctr"/>
+                <a:endParaRPr lang="en-SG"/>
+              </a:p>
+            </p:txBody>
+          </p:sp>
+        </p:grpSp>
+      </p:grpSp>
+      <p:grpSp>
+        <p:nvGrpSpPr>
+          <p:cNvPr id="94" name="Group 93">
+            <a:extLst>
+              <a:ext uri="{FF2B5EF4-FFF2-40B4-BE49-F238E27FC236}">
+                <a16:creationId xmlns:a16="http://schemas.microsoft.com/office/drawing/2014/main" id="{EB42A74F-AB60-44CC-BA62-792AD3C4DE3E}"/>
+              </a:ext>
+            </a:extLst>
+          </p:cNvPr>
+          <p:cNvGrpSpPr/>
+          <p:nvPr/>
+        </p:nvGrpSpPr>
+        <p:grpSpPr>
+          <a:xfrm>
+            <a:off x="1821673" y="4889191"/>
+            <a:ext cx="8281719" cy="860975"/>
+            <a:chOff x="1963479" y="4681088"/>
+            <a:chExt cx="8281719" cy="860975"/>
+          </a:xfrm>
+        </p:grpSpPr>
+        <p:grpSp>
+          <p:nvGrpSpPr>
+            <p:cNvPr id="72" name="Group 71">
+              <a:extLst>
+                <a:ext uri="{FF2B5EF4-FFF2-40B4-BE49-F238E27FC236}">
+                  <a16:creationId xmlns:a16="http://schemas.microsoft.com/office/drawing/2014/main" id="{2BBEAFF6-8916-44B0-84E9-47BFDE0CC7CC}"/>
+                </a:ext>
+              </a:extLst>
+            </p:cNvPr>
+            <p:cNvGrpSpPr/>
+            <p:nvPr/>
+          </p:nvGrpSpPr>
+          <p:grpSpPr>
+            <a:xfrm>
+              <a:off x="2864390" y="4681088"/>
+              <a:ext cx="1908692" cy="842403"/>
+              <a:chOff x="4775502" y="2861787"/>
+              <a:chExt cx="1908692" cy="842403"/>
+            </a:xfrm>
+          </p:grpSpPr>
+          <p:sp>
+            <p:nvSpPr>
+              <p:cNvPr id="73" name="TextBox 72">
+                <a:extLst>
+                  <a:ext uri="{FF2B5EF4-FFF2-40B4-BE49-F238E27FC236}">
+                    <a16:creationId xmlns:a16="http://schemas.microsoft.com/office/drawing/2014/main" id="{65666E04-9FAE-4D3E-860D-64D61A2DB758}"/>
+                  </a:ext>
+                </a:extLst>
+              </p:cNvPr>
+              <p:cNvSpPr txBox="1"/>
+              <p:nvPr/>
+            </p:nvSpPr>
+            <p:spPr>
+              <a:xfrm>
+                <a:off x="4917742" y="2879534"/>
+                <a:ext cx="697583" cy="369332"/>
+              </a:xfrm>
+              <a:prstGeom prst="rect">
+                <a:avLst/>
+              </a:prstGeom>
+              <a:noFill/>
+            </p:spPr>
+            <p:txBody>
+              <a:bodyPr wrap="square" rtlCol="0">
+                <a:spAutoFit/>
+              </a:bodyPr>
+              <a:lstStyle/>
+              <a:p>
+                <a:r>
+                  <a:rPr lang="en-SG" dirty="0"/>
+                  <a:t>Press</a:t>
+                </a:r>
+              </a:p>
+            </p:txBody>
+          </p:sp>
+          <p:grpSp>
+            <p:nvGrpSpPr>
+              <p:cNvPr id="74" name="Group 73">
+                <a:extLst>
+                  <a:ext uri="{FF2B5EF4-FFF2-40B4-BE49-F238E27FC236}">
+                    <a16:creationId xmlns:a16="http://schemas.microsoft.com/office/drawing/2014/main" id="{56B1806C-BAE5-4DC5-9E96-8318D4F6E102}"/>
+                  </a:ext>
+                </a:extLst>
+              </p:cNvPr>
+              <p:cNvGrpSpPr/>
+              <p:nvPr/>
+            </p:nvGrpSpPr>
+            <p:grpSpPr>
+              <a:xfrm>
+                <a:off x="5628186" y="2861787"/>
+                <a:ext cx="665161" cy="369332"/>
+                <a:chOff x="5487401" y="1855555"/>
+                <a:chExt cx="665161" cy="369332"/>
+              </a:xfrm>
+            </p:grpSpPr>
+            <p:sp>
+              <p:nvSpPr>
+                <p:cNvPr id="76" name="Rectangle 75">
+                  <a:extLst>
+                    <a:ext uri="{FF2B5EF4-FFF2-40B4-BE49-F238E27FC236}">
+                      <a16:creationId xmlns:a16="http://schemas.microsoft.com/office/drawing/2014/main" id="{75C4F4F0-F264-4CA2-8E95-24AE32EE024A}"/>
+                    </a:ext>
+                  </a:extLst>
+                </p:cNvPr>
+                <p:cNvSpPr/>
+                <p:nvPr/>
+              </p:nvSpPr>
+              <p:spPr>
+                <a:xfrm>
+                  <a:off x="5487401" y="1919329"/>
+                  <a:ext cx="608599" cy="277278"/>
+                </a:xfrm>
+                <a:prstGeom prst="rect">
+                  <a:avLst/>
+                </a:prstGeom>
+                <a:ln>
+                  <a:noFill/>
+                </a:ln>
+                <a:effectLst>
+                  <a:outerShdw blurRad="107950" dist="12700" dir="5400000" algn="ctr">
+                    <a:srgbClr val="000000"/>
+                  </a:outerShdw>
+                </a:effectLst>
+                <a:scene3d>
+                  <a:camera prst="orthographicFront">
+                    <a:rot lat="0" lon="0" rev="0"/>
+                  </a:camera>
+                  <a:lightRig rig="soft" dir="t">
+                    <a:rot lat="0" lon="0" rev="0"/>
+                  </a:lightRig>
+                </a:scene3d>
+                <a:sp3d contourW="44450" prstMaterial="matte">
+                  <a:bevelT w="63500" h="63500" prst="artDeco"/>
+                  <a:contourClr>
+                    <a:srgbClr val="FFFFFF"/>
+                  </a:contourClr>
+                </a:sp3d>
+              </p:spPr>
+              <p:style>
+                <a:lnRef idx="2">
+                  <a:schemeClr val="dk1"/>
+                </a:lnRef>
+                <a:fillRef idx="1">
+                  <a:schemeClr val="lt1"/>
+                </a:fillRef>
+                <a:effectRef idx="0">
+                  <a:schemeClr val="dk1"/>
+                </a:effectRef>
+                <a:fontRef idx="minor">
+                  <a:schemeClr val="dk1"/>
+                </a:fontRef>
+              </p:style>
+              <p:txBody>
+                <a:bodyPr rtlCol="0" anchor="ctr"/>
+                <a:lstStyle/>
+                <a:p>
+                  <a:pPr algn="ctr"/>
+                  <a:endParaRPr lang="en-SG"/>
+                </a:p>
+              </p:txBody>
+            </p:sp>
+            <p:sp>
+              <p:nvSpPr>
+                <p:cNvPr id="77" name="TextBox 76">
+                  <a:extLst>
+                    <a:ext uri="{FF2B5EF4-FFF2-40B4-BE49-F238E27FC236}">
+                      <a16:creationId xmlns:a16="http://schemas.microsoft.com/office/drawing/2014/main" id="{93DEB6F7-2C37-4986-9D71-C7E1288FFD65}"/>
+                    </a:ext>
+                  </a:extLst>
+                </p:cNvPr>
+                <p:cNvSpPr txBox="1"/>
+                <p:nvPr/>
+              </p:nvSpPr>
+              <p:spPr>
+                <a:xfrm>
+                  <a:off x="5544553" y="1855555"/>
+                  <a:ext cx="608009" cy="369332"/>
+                </a:xfrm>
+                <a:prstGeom prst="rect">
+                  <a:avLst/>
+                </a:prstGeom>
+                <a:noFill/>
+              </p:spPr>
+              <p:txBody>
+                <a:bodyPr wrap="square" rtlCol="0">
+                  <a:spAutoFit/>
+                </a:bodyPr>
+                <a:lstStyle/>
+                <a:p>
+                  <a:r>
+                    <a:rPr lang="en-SG" dirty="0"/>
+                    <a:t>Tab</a:t>
+                  </a:r>
+                </a:p>
+              </p:txBody>
+            </p:sp>
+          </p:grpSp>
+          <p:sp>
+            <p:nvSpPr>
+              <p:cNvPr id="75" name="Arrow: Right 74">
+                <a:extLst>
+                  <a:ext uri="{FF2B5EF4-FFF2-40B4-BE49-F238E27FC236}">
+                    <a16:creationId xmlns:a16="http://schemas.microsoft.com/office/drawing/2014/main" id="{79D17632-F721-4242-AC68-ACABD7191A19}"/>
+                  </a:ext>
+                </a:extLst>
+              </p:cNvPr>
+              <p:cNvSpPr/>
+              <p:nvPr/>
+            </p:nvSpPr>
+            <p:spPr>
+              <a:xfrm>
+                <a:off x="4775502" y="3187341"/>
+                <a:ext cx="1908692" cy="516849"/>
+              </a:xfrm>
+              <a:prstGeom prst="rightArrow">
+                <a:avLst>
+                  <a:gd name="adj1" fmla="val 46352"/>
+                  <a:gd name="adj2" fmla="val 50000"/>
+                </a:avLst>
+              </a:prstGeom>
+            </p:spPr>
+            <p:style>
+              <a:lnRef idx="2">
+                <a:schemeClr val="accent1">
+                  <a:shade val="50000"/>
+                </a:schemeClr>
+              </a:lnRef>
+              <a:fillRef idx="1">
+                <a:schemeClr val="accent1"/>
+              </a:fillRef>
+              <a:effectRef idx="0">
+                <a:schemeClr val="accent1"/>
+              </a:effectRef>
+              <a:fontRef idx="minor">
+                <a:schemeClr val="lt1"/>
+              </a:fontRef>
+            </p:style>
+            <p:txBody>
+              <a:bodyPr rtlCol="0" anchor="ctr"/>
+              <a:lstStyle/>
+              <a:p>
+                <a:pPr algn="ctr"/>
+                <a:endParaRPr lang="en-SG"/>
+              </a:p>
+            </p:txBody>
+          </p:sp>
+        </p:grpSp>
+        <p:grpSp>
+          <p:nvGrpSpPr>
+            <p:cNvPr id="78" name="Group 77">
+              <a:extLst>
+                <a:ext uri="{FF2B5EF4-FFF2-40B4-BE49-F238E27FC236}">
+                  <a16:creationId xmlns:a16="http://schemas.microsoft.com/office/drawing/2014/main" id="{83AD618F-67CF-4E38-A590-DEEDBC93FB04}"/>
+                </a:ext>
+              </a:extLst>
+            </p:cNvPr>
+            <p:cNvGrpSpPr/>
+            <p:nvPr/>
+          </p:nvGrpSpPr>
+          <p:grpSpPr>
+            <a:xfrm>
+              <a:off x="6684618" y="4698835"/>
+              <a:ext cx="1908692" cy="842403"/>
+              <a:chOff x="4775502" y="2861787"/>
+              <a:chExt cx="1908692" cy="842403"/>
+            </a:xfrm>
+          </p:grpSpPr>
+          <p:sp>
+            <p:nvSpPr>
+              <p:cNvPr id="79" name="TextBox 78">
+                <a:extLst>
+                  <a:ext uri="{FF2B5EF4-FFF2-40B4-BE49-F238E27FC236}">
+                    <a16:creationId xmlns:a16="http://schemas.microsoft.com/office/drawing/2014/main" id="{3551892C-8823-4B81-B305-83DADA2886F1}"/>
+                  </a:ext>
+                </a:extLst>
+              </p:cNvPr>
+              <p:cNvSpPr txBox="1"/>
+              <p:nvPr/>
+            </p:nvSpPr>
+            <p:spPr>
+              <a:xfrm>
+                <a:off x="4917742" y="2879534"/>
+                <a:ext cx="697583" cy="369332"/>
+              </a:xfrm>
+              <a:prstGeom prst="rect">
+                <a:avLst/>
+              </a:prstGeom>
+              <a:noFill/>
+            </p:spPr>
+            <p:txBody>
+              <a:bodyPr wrap="square" rtlCol="0">
+                <a:spAutoFit/>
+              </a:bodyPr>
+              <a:lstStyle/>
+              <a:p>
+                <a:r>
+                  <a:rPr lang="en-SG" dirty="0"/>
+                  <a:t>Press</a:t>
+                </a:r>
+              </a:p>
+            </p:txBody>
+          </p:sp>
+          <p:grpSp>
+            <p:nvGrpSpPr>
+              <p:cNvPr id="80" name="Group 79">
+                <a:extLst>
+                  <a:ext uri="{FF2B5EF4-FFF2-40B4-BE49-F238E27FC236}">
+                    <a16:creationId xmlns:a16="http://schemas.microsoft.com/office/drawing/2014/main" id="{27E51ED9-8CD2-4611-B43B-04D047B58BFA}"/>
+                  </a:ext>
+                </a:extLst>
+              </p:cNvPr>
+              <p:cNvGrpSpPr/>
+              <p:nvPr/>
+            </p:nvGrpSpPr>
+            <p:grpSpPr>
+              <a:xfrm>
+                <a:off x="5628186" y="2861787"/>
+                <a:ext cx="665161" cy="369332"/>
+                <a:chOff x="5487401" y="1855555"/>
+                <a:chExt cx="665161" cy="369332"/>
+              </a:xfrm>
+            </p:grpSpPr>
+            <p:sp>
+              <p:nvSpPr>
+                <p:cNvPr id="82" name="Rectangle 81">
+                  <a:extLst>
+                    <a:ext uri="{FF2B5EF4-FFF2-40B4-BE49-F238E27FC236}">
+                      <a16:creationId xmlns:a16="http://schemas.microsoft.com/office/drawing/2014/main" id="{D5221C44-D0CC-42E2-8349-241ABD6AB96C}"/>
+                    </a:ext>
+                  </a:extLst>
+                </p:cNvPr>
+                <p:cNvSpPr/>
+                <p:nvPr/>
+              </p:nvSpPr>
+              <p:spPr>
+                <a:xfrm>
+                  <a:off x="5487401" y="1919329"/>
+                  <a:ext cx="608599" cy="277278"/>
+                </a:xfrm>
+                <a:prstGeom prst="rect">
+                  <a:avLst/>
+                </a:prstGeom>
+                <a:ln>
+                  <a:noFill/>
+                </a:ln>
+                <a:effectLst>
+                  <a:outerShdw blurRad="107950" dist="12700" dir="5400000" algn="ctr">
+                    <a:srgbClr val="000000"/>
+                  </a:outerShdw>
+                </a:effectLst>
+                <a:scene3d>
+                  <a:camera prst="orthographicFront">
+                    <a:rot lat="0" lon="0" rev="0"/>
+                  </a:camera>
+                  <a:lightRig rig="soft" dir="t">
+                    <a:rot lat="0" lon="0" rev="0"/>
+                  </a:lightRig>
+                </a:scene3d>
+                <a:sp3d contourW="44450" prstMaterial="matte">
+                  <a:bevelT w="63500" h="63500" prst="artDeco"/>
+                  <a:contourClr>
+                    <a:srgbClr val="FFFFFF"/>
+                  </a:contourClr>
+                </a:sp3d>
+              </p:spPr>
+              <p:style>
+                <a:lnRef idx="2">
+                  <a:schemeClr val="dk1"/>
+                </a:lnRef>
+                <a:fillRef idx="1">
+                  <a:schemeClr val="lt1"/>
+                </a:fillRef>
+                <a:effectRef idx="0">
+                  <a:schemeClr val="dk1"/>
+                </a:effectRef>
+                <a:fontRef idx="minor">
+                  <a:schemeClr val="dk1"/>
+                </a:fontRef>
+              </p:style>
+              <p:txBody>
+                <a:bodyPr rtlCol="0" anchor="ctr"/>
+                <a:lstStyle/>
+                <a:p>
+                  <a:pPr algn="ctr"/>
+                  <a:endParaRPr lang="en-SG"/>
+                </a:p>
+              </p:txBody>
+            </p:sp>
+            <p:sp>
+              <p:nvSpPr>
+                <p:cNvPr id="83" name="TextBox 82">
+                  <a:extLst>
+                    <a:ext uri="{FF2B5EF4-FFF2-40B4-BE49-F238E27FC236}">
+                      <a16:creationId xmlns:a16="http://schemas.microsoft.com/office/drawing/2014/main" id="{9A5C25B6-E2AA-45F4-AA30-647E655E50AF}"/>
+                    </a:ext>
+                  </a:extLst>
+                </p:cNvPr>
+                <p:cNvSpPr txBox="1"/>
+                <p:nvPr/>
+              </p:nvSpPr>
+              <p:spPr>
+                <a:xfrm>
+                  <a:off x="5544553" y="1855555"/>
+                  <a:ext cx="608009" cy="369332"/>
+                </a:xfrm>
+                <a:prstGeom prst="rect">
+                  <a:avLst/>
+                </a:prstGeom>
+                <a:noFill/>
+              </p:spPr>
+              <p:txBody>
+                <a:bodyPr wrap="square" rtlCol="0">
+                  <a:spAutoFit/>
+                </a:bodyPr>
+                <a:lstStyle/>
+                <a:p>
+                  <a:r>
+                    <a:rPr lang="en-SG" dirty="0"/>
+                    <a:t>Tab</a:t>
+                  </a:r>
+                </a:p>
+              </p:txBody>
+            </p:sp>
+          </p:grpSp>
+          <p:sp>
+            <p:nvSpPr>
+              <p:cNvPr id="81" name="Arrow: Right 80">
+                <a:extLst>
+                  <a:ext uri="{FF2B5EF4-FFF2-40B4-BE49-F238E27FC236}">
+                    <a16:creationId xmlns:a16="http://schemas.microsoft.com/office/drawing/2014/main" id="{F9516B5E-00FE-40A9-A00D-27997B5AB80B}"/>
+                  </a:ext>
+                </a:extLst>
+              </p:cNvPr>
+              <p:cNvSpPr/>
+              <p:nvPr/>
+            </p:nvSpPr>
+            <p:spPr>
+              <a:xfrm>
+                <a:off x="4775502" y="3187341"/>
+                <a:ext cx="1908692" cy="516849"/>
+              </a:xfrm>
+              <a:prstGeom prst="rightArrow">
+                <a:avLst>
+                  <a:gd name="adj1" fmla="val 46352"/>
+                  <a:gd name="adj2" fmla="val 50000"/>
+                </a:avLst>
+              </a:prstGeom>
+            </p:spPr>
+            <p:style>
+              <a:lnRef idx="2">
+                <a:schemeClr val="accent1">
+                  <a:shade val="50000"/>
+                </a:schemeClr>
+              </a:lnRef>
+              <a:fillRef idx="1">
+                <a:schemeClr val="accent1"/>
+              </a:fillRef>
+              <a:effectRef idx="0">
+                <a:schemeClr val="accent1"/>
+              </a:effectRef>
+              <a:fontRef idx="minor">
+                <a:schemeClr val="lt1"/>
+              </a:fontRef>
+            </p:style>
+            <p:txBody>
+              <a:bodyPr rtlCol="0" anchor="ctr"/>
+              <a:lstStyle/>
+              <a:p>
+                <a:pPr algn="ctr"/>
+                <a:endParaRPr lang="en-SG"/>
+              </a:p>
+            </p:txBody>
+          </p:sp>
+        </p:grpSp>
+        <p:pic>
+          <p:nvPicPr>
+            <p:cNvPr id="88" name="Picture 87">
+              <a:extLst>
+                <a:ext uri="{FF2B5EF4-FFF2-40B4-BE49-F238E27FC236}">
+                  <a16:creationId xmlns:a16="http://schemas.microsoft.com/office/drawing/2014/main" id="{0B681566-2F8C-4A27-848A-407C0D1EE45D}"/>
+                </a:ext>
+              </a:extLst>
+            </p:cNvPr>
+            <p:cNvPicPr>
+              <a:picLocks noChangeAspect="1"/>
+            </p:cNvPicPr>
+            <p:nvPr/>
+          </p:nvPicPr>
+          <p:blipFill>
+            <a:blip r:embed="rId10">
+              <a:extLst>
+                <a:ext uri="{28A0092B-C50C-407E-A947-70E740481C1C}">
+                  <a14:useLocalDpi xmlns:a14="http://schemas.microsoft.com/office/drawing/2010/main" val="0"/>
+                </a:ext>
+              </a:extLst>
+            </a:blip>
+            <a:stretch>
+              <a:fillRect/>
+            </a:stretch>
+          </p:blipFill>
+          <p:spPr>
+            <a:xfrm>
+              <a:off x="1963479" y="5004170"/>
+              <a:ext cx="513020" cy="537068"/>
+            </a:xfrm>
+            <a:prstGeom prst="rect">
+              <a:avLst/>
+            </a:prstGeom>
+          </p:spPr>
+        </p:pic>
+        <p:pic>
+          <p:nvPicPr>
+            <p:cNvPr id="90" name="Picture 89">
+              <a:extLst>
+                <a:ext uri="{FF2B5EF4-FFF2-40B4-BE49-F238E27FC236}">
+                  <a16:creationId xmlns:a16="http://schemas.microsoft.com/office/drawing/2014/main" id="{C9384809-919E-4DF6-98D9-7967C05FAFF3}"/>
+                </a:ext>
+              </a:extLst>
+            </p:cNvPr>
+            <p:cNvPicPr>
+              <a:picLocks noChangeAspect="1"/>
+            </p:cNvPicPr>
+            <p:nvPr/>
+          </p:nvPicPr>
+          <p:blipFill rotWithShape="1">
+            <a:blip r:embed="rId11">
+              <a:extLst>
+                <a:ext uri="{28A0092B-C50C-407E-A947-70E740481C1C}">
+                  <a14:useLocalDpi xmlns:a14="http://schemas.microsoft.com/office/drawing/2010/main" val="0"/>
+                </a:ext>
+              </a:extLst>
+            </a:blip>
+            <a:srcRect t="4602"/>
+            <a:stretch/>
+          </p:blipFill>
+          <p:spPr>
+            <a:xfrm>
+              <a:off x="5082007" y="5004170"/>
+              <a:ext cx="1213421" cy="518425"/>
+            </a:xfrm>
+            <a:prstGeom prst="rect">
+              <a:avLst/>
+            </a:prstGeom>
+          </p:spPr>
+        </p:pic>
+        <p:pic>
+          <p:nvPicPr>
+            <p:cNvPr id="92" name="Picture 91">
+              <a:extLst>
+                <a:ext uri="{FF2B5EF4-FFF2-40B4-BE49-F238E27FC236}">
+                  <a16:creationId xmlns:a16="http://schemas.microsoft.com/office/drawing/2014/main" id="{FAB1F847-3CB7-429D-B1E7-A53575F94A88}"/>
+                </a:ext>
+              </a:extLst>
+            </p:cNvPr>
+            <p:cNvPicPr>
+              <a:picLocks noChangeAspect="1"/>
+            </p:cNvPicPr>
+            <p:nvPr/>
+          </p:nvPicPr>
+          <p:blipFill rotWithShape="1">
+            <a:blip r:embed="rId12">
+              <a:extLst>
+                <a:ext uri="{28A0092B-C50C-407E-A947-70E740481C1C}">
+                  <a14:useLocalDpi xmlns:a14="http://schemas.microsoft.com/office/drawing/2010/main" val="0"/>
+                </a:ext>
+              </a:extLst>
+            </a:blip>
+            <a:srcRect l="5703" t="-1490" r="9993" b="1490"/>
+            <a:stretch/>
+          </p:blipFill>
+          <p:spPr>
+            <a:xfrm>
+              <a:off x="8982524" y="5008963"/>
+              <a:ext cx="1262674" cy="533100"/>
+            </a:xfrm>
+            <a:prstGeom prst="rect">
+              <a:avLst/>
+            </a:prstGeom>
+          </p:spPr>
+        </p:pic>
+      </p:grpSp>
+    </p:spTree>
+    <p:extLst>
+      <p:ext uri="{BB962C8B-B14F-4D97-AF65-F5344CB8AC3E}">
+        <p14:creationId xmlns:p14="http://schemas.microsoft.com/office/powerpoint/2010/main" val="112267645"/>
+      </p:ext>
+    </p:extLst>
+  </p:cSld>
+  <p:clrMapOvr>
+    <a:masterClrMapping/>
+  </p:clrMapOvr>
+</p:sld>
+</file>
+
 <file path=ppt/theme/theme1.xml><?xml version="1.0" encoding="utf-8"?>
 <a:theme xmlns:a="http://schemas.openxmlformats.org/drawingml/2006/main" name="Office Theme">
   <a:themeElements>

</xml_diff>

<commit_message>
Edit autofill to not have status
</commit_message>
<xml_diff>
--- a/docs/diagrams/AutofillCommandDiagram.pptx
+++ b/docs/diagrams/AutofillCommandDiagram.pptx
@@ -263,7 +263,7 @@
           <a:p>
             <a:fld id="{181FA2F3-BF46-4223-8368-B788E003980A}" type="datetimeFigureOut">
               <a:rPr lang="en-SG" smtClean="0"/>
-              <a:t>9/4/2018</a:t>
+              <a:t>14/4/2018</a:t>
             </a:fld>
             <a:endParaRPr lang="en-SG"/>
           </a:p>
@@ -463,7 +463,7 @@
           <a:p>
             <a:fld id="{181FA2F3-BF46-4223-8368-B788E003980A}" type="datetimeFigureOut">
               <a:rPr lang="en-SG" smtClean="0"/>
-              <a:t>9/4/2018</a:t>
+              <a:t>14/4/2018</a:t>
             </a:fld>
             <a:endParaRPr lang="en-SG"/>
           </a:p>
@@ -673,7 +673,7 @@
           <a:p>
             <a:fld id="{181FA2F3-BF46-4223-8368-B788E003980A}" type="datetimeFigureOut">
               <a:rPr lang="en-SG" smtClean="0"/>
-              <a:t>9/4/2018</a:t>
+              <a:t>14/4/2018</a:t>
             </a:fld>
             <a:endParaRPr lang="en-SG"/>
           </a:p>
@@ -873,7 +873,7 @@
           <a:p>
             <a:fld id="{181FA2F3-BF46-4223-8368-B788E003980A}" type="datetimeFigureOut">
               <a:rPr lang="en-SG" smtClean="0"/>
-              <a:t>9/4/2018</a:t>
+              <a:t>14/4/2018</a:t>
             </a:fld>
             <a:endParaRPr lang="en-SG"/>
           </a:p>
@@ -1149,7 +1149,7 @@
           <a:p>
             <a:fld id="{181FA2F3-BF46-4223-8368-B788E003980A}" type="datetimeFigureOut">
               <a:rPr lang="en-SG" smtClean="0"/>
-              <a:t>9/4/2018</a:t>
+              <a:t>14/4/2018</a:t>
             </a:fld>
             <a:endParaRPr lang="en-SG"/>
           </a:p>
@@ -1417,7 +1417,7 @@
           <a:p>
             <a:fld id="{181FA2F3-BF46-4223-8368-B788E003980A}" type="datetimeFigureOut">
               <a:rPr lang="en-SG" smtClean="0"/>
-              <a:t>9/4/2018</a:t>
+              <a:t>14/4/2018</a:t>
             </a:fld>
             <a:endParaRPr lang="en-SG"/>
           </a:p>
@@ -1832,7 +1832,7 @@
           <a:p>
             <a:fld id="{181FA2F3-BF46-4223-8368-B788E003980A}" type="datetimeFigureOut">
               <a:rPr lang="en-SG" smtClean="0"/>
-              <a:t>9/4/2018</a:t>
+              <a:t>14/4/2018</a:t>
             </a:fld>
             <a:endParaRPr lang="en-SG"/>
           </a:p>
@@ -1974,7 +1974,7 @@
           <a:p>
             <a:fld id="{181FA2F3-BF46-4223-8368-B788E003980A}" type="datetimeFigureOut">
               <a:rPr lang="en-SG" smtClean="0"/>
-              <a:t>9/4/2018</a:t>
+              <a:t>14/4/2018</a:t>
             </a:fld>
             <a:endParaRPr lang="en-SG"/>
           </a:p>
@@ -2087,7 +2087,7 @@
           <a:p>
             <a:fld id="{181FA2F3-BF46-4223-8368-B788E003980A}" type="datetimeFigureOut">
               <a:rPr lang="en-SG" smtClean="0"/>
-              <a:t>9/4/2018</a:t>
+              <a:t>14/4/2018</a:t>
             </a:fld>
             <a:endParaRPr lang="en-SG"/>
           </a:p>
@@ -2400,7 +2400,7 @@
           <a:p>
             <a:fld id="{181FA2F3-BF46-4223-8368-B788E003980A}" type="datetimeFigureOut">
               <a:rPr lang="en-SG" smtClean="0"/>
-              <a:t>9/4/2018</a:t>
+              <a:t>14/4/2018</a:t>
             </a:fld>
             <a:endParaRPr lang="en-SG"/>
           </a:p>
@@ -2689,7 +2689,7 @@
           <a:p>
             <a:fld id="{181FA2F3-BF46-4223-8368-B788E003980A}" type="datetimeFigureOut">
               <a:rPr lang="en-SG" smtClean="0"/>
-              <a:t>9/4/2018</a:t>
+              <a:t>14/4/2018</a:t>
             </a:fld>
             <a:endParaRPr lang="en-SG"/>
           </a:p>
@@ -2932,7 +2932,7 @@
           <a:p>
             <a:fld id="{181FA2F3-BF46-4223-8368-B788E003980A}" type="datetimeFigureOut">
               <a:rPr lang="en-SG" smtClean="0"/>
-              <a:t>9/4/2018</a:t>
+              <a:t>14/4/2018</a:t>
             </a:fld>
             <a:endParaRPr lang="en-SG"/>
           </a:p>
@@ -3351,10 +3351,10 @@
       </p:grpSpPr>
       <p:grpSp>
         <p:nvGrpSpPr>
-          <p:cNvPr id="42" name="Group 41">
+          <p:cNvPr id="21" name="Group 20">
             <a:extLst>
               <a:ext uri="{FF2B5EF4-FFF2-40B4-BE49-F238E27FC236}">
-                <a16:creationId xmlns:a16="http://schemas.microsoft.com/office/drawing/2014/main" id="{F5CC8B69-9292-41BC-ACCD-C5762CEE74FB}"/>
+                <a16:creationId xmlns:a16="http://schemas.microsoft.com/office/drawing/2014/main" id="{E2247DBC-39C8-4C8B-BB7C-BCAFCE570368}"/>
               </a:ext>
             </a:extLst>
           </p:cNvPr>
@@ -3363,54 +3363,280 @@
         </p:nvGrpSpPr>
         <p:grpSpPr>
           <a:xfrm>
-            <a:off x="1316445" y="800197"/>
-            <a:ext cx="8623481" cy="842403"/>
-            <a:chOff x="1311369" y="809624"/>
-            <a:chExt cx="8623481" cy="842403"/>
+            <a:off x="2078368" y="810116"/>
+            <a:ext cx="7697228" cy="842403"/>
+            <a:chOff x="2078368" y="810116"/>
+            <a:chExt cx="7697228" cy="842403"/>
           </a:xfrm>
         </p:grpSpPr>
-        <p:pic>
-          <p:nvPicPr>
-            <p:cNvPr id="5" name="Picture 4">
+        <p:grpSp>
+          <p:nvGrpSpPr>
+            <p:cNvPr id="42" name="Group 41">
               <a:extLst>
                 <a:ext uri="{FF2B5EF4-FFF2-40B4-BE49-F238E27FC236}">
-                  <a16:creationId xmlns:a16="http://schemas.microsoft.com/office/drawing/2014/main" id="{A2A744AD-E195-43DE-BDAE-9EF89199C531}"/>
+                  <a16:creationId xmlns:a16="http://schemas.microsoft.com/office/drawing/2014/main" id="{F5CC8B69-9292-41BC-ACCD-C5762CEE74FB}"/>
                 </a:ext>
               </a:extLst>
             </p:cNvPr>
-            <p:cNvPicPr>
-              <a:picLocks noChangeAspect="1"/>
-            </p:cNvPicPr>
+            <p:cNvGrpSpPr/>
             <p:nvPr/>
-          </p:nvPicPr>
-          <p:blipFill>
-            <a:blip r:embed="rId2">
-              <a:extLst>
-                <a:ext uri="{28A0092B-C50C-407E-A947-70E740481C1C}">
-                  <a14:useLocalDpi xmlns:a14="http://schemas.microsoft.com/office/drawing/2010/main" val="0"/>
-                </a:ext>
-              </a:extLst>
-            </a:blip>
-            <a:stretch>
-              <a:fillRect/>
-            </a:stretch>
-          </p:blipFill>
-          <p:spPr>
+          </p:nvGrpSpPr>
+          <p:grpSpPr>
             <a:xfrm>
-              <a:off x="1311369" y="1089701"/>
-              <a:ext cx="3005107" cy="516849"/>
+              <a:off x="2078368" y="810116"/>
+              <a:ext cx="4567960" cy="842403"/>
+              <a:chOff x="2116234" y="809624"/>
+              <a:chExt cx="4567960" cy="842403"/>
             </a:xfrm>
-            <a:prstGeom prst="rect">
-              <a:avLst/>
-            </a:prstGeom>
-          </p:spPr>
-        </p:pic>
+          </p:grpSpPr>
+          <p:pic>
+            <p:nvPicPr>
+              <p:cNvPr id="5" name="Picture 4">
+                <a:extLst>
+                  <a:ext uri="{FF2B5EF4-FFF2-40B4-BE49-F238E27FC236}">
+                    <a16:creationId xmlns:a16="http://schemas.microsoft.com/office/drawing/2014/main" id="{A2A744AD-E195-43DE-BDAE-9EF89199C531}"/>
+                  </a:ext>
+                </a:extLst>
+              </p:cNvPr>
+              <p:cNvPicPr>
+                <a:picLocks noChangeAspect="1"/>
+              </p:cNvPicPr>
+              <p:nvPr/>
+            </p:nvPicPr>
+            <p:blipFill rotWithShape="1">
+              <a:blip r:embed="rId2">
+                <a:extLst>
+                  <a:ext uri="{28A0092B-C50C-407E-A947-70E740481C1C}">
+                    <a14:useLocalDpi xmlns:a14="http://schemas.microsoft.com/office/drawing/2010/main" val="0"/>
+                  </a:ext>
+                </a:extLst>
+              </a:blip>
+              <a:srcRect r="36485"/>
+              <a:stretch/>
+            </p:blipFill>
+            <p:spPr>
+              <a:xfrm>
+                <a:off x="2116234" y="1068578"/>
+                <a:ext cx="1908693" cy="516849"/>
+              </a:xfrm>
+              <a:prstGeom prst="rect">
+                <a:avLst/>
+              </a:prstGeom>
+            </p:spPr>
+          </p:pic>
+          <p:sp>
+            <p:nvSpPr>
+              <p:cNvPr id="11" name="TextBox 10">
+                <a:extLst>
+                  <a:ext uri="{FF2B5EF4-FFF2-40B4-BE49-F238E27FC236}">
+                    <a16:creationId xmlns:a16="http://schemas.microsoft.com/office/drawing/2014/main" id="{7A5CB6A4-B4B0-44C8-9B24-406C6DCE4CDE}"/>
+                  </a:ext>
+                </a:extLst>
+              </p:cNvPr>
+              <p:cNvSpPr txBox="1"/>
+              <p:nvPr/>
+            </p:nvSpPr>
+            <p:spPr>
+              <a:xfrm>
+                <a:off x="4917742" y="827371"/>
+                <a:ext cx="697583" cy="369332"/>
+              </a:xfrm>
+              <a:prstGeom prst="rect">
+                <a:avLst/>
+              </a:prstGeom>
+              <a:noFill/>
+            </p:spPr>
+            <p:txBody>
+              <a:bodyPr wrap="square" rtlCol="0">
+                <a:spAutoFit/>
+              </a:bodyPr>
+              <a:lstStyle/>
+              <a:p>
+                <a:r>
+                  <a:rPr lang="en-SG" dirty="0"/>
+                  <a:t>Press</a:t>
+                </a:r>
+              </a:p>
+            </p:txBody>
+          </p:sp>
+          <p:grpSp>
+            <p:nvGrpSpPr>
+              <p:cNvPr id="14" name="Group 13">
+                <a:extLst>
+                  <a:ext uri="{FF2B5EF4-FFF2-40B4-BE49-F238E27FC236}">
+                    <a16:creationId xmlns:a16="http://schemas.microsoft.com/office/drawing/2014/main" id="{52DC0776-C7D0-446C-9E47-B55D9D94E81C}"/>
+                  </a:ext>
+                </a:extLst>
+              </p:cNvPr>
+              <p:cNvGrpSpPr/>
+              <p:nvPr/>
+            </p:nvGrpSpPr>
+            <p:grpSpPr>
+              <a:xfrm>
+                <a:off x="5628186" y="809624"/>
+                <a:ext cx="665161" cy="369332"/>
+                <a:chOff x="5487401" y="1855555"/>
+                <a:chExt cx="665161" cy="369332"/>
+              </a:xfrm>
+            </p:grpSpPr>
+            <p:sp>
+              <p:nvSpPr>
+                <p:cNvPr id="12" name="Rectangle 11">
+                  <a:extLst>
+                    <a:ext uri="{FF2B5EF4-FFF2-40B4-BE49-F238E27FC236}">
+                      <a16:creationId xmlns:a16="http://schemas.microsoft.com/office/drawing/2014/main" id="{3C0FFBD2-FA58-4887-A4A2-5D09D8C6BDEA}"/>
+                    </a:ext>
+                  </a:extLst>
+                </p:cNvPr>
+                <p:cNvSpPr/>
+                <p:nvPr/>
+              </p:nvSpPr>
+              <p:spPr>
+                <a:xfrm>
+                  <a:off x="5487401" y="1919329"/>
+                  <a:ext cx="608599" cy="277278"/>
+                </a:xfrm>
+                <a:prstGeom prst="rect">
+                  <a:avLst/>
+                </a:prstGeom>
+                <a:ln>
+                  <a:noFill/>
+                </a:ln>
+                <a:effectLst>
+                  <a:outerShdw blurRad="107950" dist="12700" dir="5400000" algn="ctr">
+                    <a:srgbClr val="000000"/>
+                  </a:outerShdw>
+                </a:effectLst>
+                <a:scene3d>
+                  <a:camera prst="orthographicFront">
+                    <a:rot lat="0" lon="0" rev="0"/>
+                  </a:camera>
+                  <a:lightRig rig="soft" dir="t">
+                    <a:rot lat="0" lon="0" rev="0"/>
+                  </a:lightRig>
+                </a:scene3d>
+                <a:sp3d contourW="44450" prstMaterial="matte">
+                  <a:bevelT w="63500" h="63500" prst="artDeco"/>
+                  <a:contourClr>
+                    <a:srgbClr val="FFFFFF"/>
+                  </a:contourClr>
+                </a:sp3d>
+              </p:spPr>
+              <p:style>
+                <a:lnRef idx="2">
+                  <a:schemeClr val="dk1"/>
+                </a:lnRef>
+                <a:fillRef idx="1">
+                  <a:schemeClr val="lt1"/>
+                </a:fillRef>
+                <a:effectRef idx="0">
+                  <a:schemeClr val="dk1"/>
+                </a:effectRef>
+                <a:fontRef idx="minor">
+                  <a:schemeClr val="dk1"/>
+                </a:fontRef>
+              </p:style>
+              <p:txBody>
+                <a:bodyPr rtlCol="0" anchor="ctr"/>
+                <a:lstStyle/>
+                <a:p>
+                  <a:pPr algn="ctr"/>
+                  <a:endParaRPr lang="en-SG"/>
+                </a:p>
+              </p:txBody>
+            </p:sp>
+            <p:sp>
+              <p:nvSpPr>
+                <p:cNvPr id="13" name="TextBox 12">
+                  <a:extLst>
+                    <a:ext uri="{FF2B5EF4-FFF2-40B4-BE49-F238E27FC236}">
+                      <a16:creationId xmlns:a16="http://schemas.microsoft.com/office/drawing/2014/main" id="{99416ED0-FAF5-40B3-AB54-F7283173CFCA}"/>
+                    </a:ext>
+                  </a:extLst>
+                </p:cNvPr>
+                <p:cNvSpPr txBox="1"/>
+                <p:nvPr/>
+              </p:nvSpPr>
+              <p:spPr>
+                <a:xfrm>
+                  <a:off x="5544553" y="1855555"/>
+                  <a:ext cx="608009" cy="369332"/>
+                </a:xfrm>
+                <a:prstGeom prst="rect">
+                  <a:avLst/>
+                </a:prstGeom>
+                <a:noFill/>
+              </p:spPr>
+              <p:txBody>
+                <a:bodyPr wrap="square" rtlCol="0">
+                  <a:spAutoFit/>
+                </a:bodyPr>
+                <a:lstStyle/>
+                <a:p>
+                  <a:r>
+                    <a:rPr lang="en-SG" dirty="0"/>
+                    <a:t>Tab</a:t>
+                  </a:r>
+                </a:p>
+              </p:txBody>
+            </p:sp>
+          </p:grpSp>
+          <p:sp>
+            <p:nvSpPr>
+              <p:cNvPr id="28" name="Arrow: Right 27">
+                <a:extLst>
+                  <a:ext uri="{FF2B5EF4-FFF2-40B4-BE49-F238E27FC236}">
+                    <a16:creationId xmlns:a16="http://schemas.microsoft.com/office/drawing/2014/main" id="{04C2CCCD-DF08-432C-834E-0170D56523AC}"/>
+                  </a:ext>
+                </a:extLst>
+              </p:cNvPr>
+              <p:cNvSpPr/>
+              <p:nvPr/>
+            </p:nvSpPr>
+            <p:spPr>
+              <a:xfrm>
+                <a:off x="4775502" y="1135178"/>
+                <a:ext cx="1908692" cy="516849"/>
+              </a:xfrm>
+              <a:prstGeom prst="rightArrow">
+                <a:avLst>
+                  <a:gd name="adj1" fmla="val 46352"/>
+                  <a:gd name="adj2" fmla="val 50000"/>
+                </a:avLst>
+              </a:prstGeom>
+            </p:spPr>
+            <p:style>
+              <a:lnRef idx="2">
+                <a:schemeClr val="accent1">
+                  <a:shade val="50000"/>
+                </a:schemeClr>
+              </a:lnRef>
+              <a:fillRef idx="1">
+                <a:schemeClr val="accent1"/>
+              </a:fillRef>
+              <a:effectRef idx="0">
+                <a:schemeClr val="accent1"/>
+              </a:effectRef>
+              <a:fontRef idx="minor">
+                <a:schemeClr val="lt1"/>
+              </a:fontRef>
+            </p:style>
+            <p:txBody>
+              <a:bodyPr rtlCol="0" anchor="ctr"/>
+              <a:lstStyle/>
+              <a:p>
+                <a:pPr algn="ctr"/>
+                <a:endParaRPr lang="en-SG"/>
+              </a:p>
+            </p:txBody>
+          </p:sp>
+        </p:grpSp>
         <p:pic>
           <p:nvPicPr>
-            <p:cNvPr id="7" name="Picture 6">
+            <p:cNvPr id="6" name="Picture 5">
               <a:extLst>
                 <a:ext uri="{FF2B5EF4-FFF2-40B4-BE49-F238E27FC236}">
-                  <a16:creationId xmlns:a16="http://schemas.microsoft.com/office/drawing/2014/main" id="{CD7200E9-9077-4354-8D25-62E0687E2317}"/>
+                  <a16:creationId xmlns:a16="http://schemas.microsoft.com/office/drawing/2014/main" id="{A8C4A118-D40D-4045-B2DB-21275DA3D64E}"/>
                 </a:ext>
               </a:extLst>
             </p:cNvPr>
@@ -3433,55 +3659,41 @@
           </p:blipFill>
           <p:spPr>
             <a:xfrm>
-              <a:off x="6929744" y="1089700"/>
-              <a:ext cx="3005106" cy="520687"/>
+              <a:off x="7148296" y="1101930"/>
+              <a:ext cx="2627300" cy="507023"/>
             </a:xfrm>
             <a:prstGeom prst="rect">
               <a:avLst/>
             </a:prstGeom>
           </p:spPr>
         </p:pic>
-        <p:sp>
-          <p:nvSpPr>
-            <p:cNvPr id="11" name="TextBox 10">
+      </p:grpSp>
+      <p:grpSp>
+        <p:nvGrpSpPr>
+          <p:cNvPr id="24" name="Group 23">
+            <a:extLst>
+              <a:ext uri="{FF2B5EF4-FFF2-40B4-BE49-F238E27FC236}">
+                <a16:creationId xmlns:a16="http://schemas.microsoft.com/office/drawing/2014/main" id="{50339FDA-967B-4D75-A1C5-C6F2E2E72E94}"/>
+              </a:ext>
+            </a:extLst>
+          </p:cNvPr>
+          <p:cNvGrpSpPr/>
+          <p:nvPr/>
+        </p:nvGrpSpPr>
+        <p:grpSpPr>
+          <a:xfrm>
+            <a:off x="1626585" y="2313001"/>
+            <a:ext cx="7960335" cy="840447"/>
+            <a:chOff x="1626585" y="2313001"/>
+            <a:chExt cx="7960335" cy="840447"/>
+          </a:xfrm>
+        </p:grpSpPr>
+        <p:grpSp>
+          <p:nvGrpSpPr>
+            <p:cNvPr id="55" name="Group 54">
               <a:extLst>
                 <a:ext uri="{FF2B5EF4-FFF2-40B4-BE49-F238E27FC236}">
-                  <a16:creationId xmlns:a16="http://schemas.microsoft.com/office/drawing/2014/main" id="{7A5CB6A4-B4B0-44C8-9B24-406C6DCE4CDE}"/>
-                </a:ext>
-              </a:extLst>
-            </p:cNvPr>
-            <p:cNvSpPr txBox="1"/>
-            <p:nvPr/>
-          </p:nvSpPr>
-          <p:spPr>
-            <a:xfrm>
-              <a:off x="4917742" y="827371"/>
-              <a:ext cx="697583" cy="369332"/>
-            </a:xfrm>
-            <a:prstGeom prst="rect">
-              <a:avLst/>
-            </a:prstGeom>
-            <a:noFill/>
-          </p:spPr>
-          <p:txBody>
-            <a:bodyPr wrap="square" rtlCol="0">
-              <a:spAutoFit/>
-            </a:bodyPr>
-            <a:lstStyle/>
-            <a:p>
-              <a:r>
-                <a:rPr lang="en-SG" dirty="0"/>
-                <a:t>Press</a:t>
-              </a:r>
-            </a:p>
-          </p:txBody>
-        </p:sp>
-        <p:grpSp>
-          <p:nvGrpSpPr>
-            <p:cNvPr id="14" name="Group 13">
-              <a:extLst>
-                <a:ext uri="{FF2B5EF4-FFF2-40B4-BE49-F238E27FC236}">
-                  <a16:creationId xmlns:a16="http://schemas.microsoft.com/office/drawing/2014/main" id="{52DC0776-C7D0-446C-9E47-B55D9D94E81C}"/>
+                  <a16:creationId xmlns:a16="http://schemas.microsoft.com/office/drawing/2014/main" id="{DFB724A4-E88C-41CC-8E17-0481FE82D15D}"/>
                 </a:ext>
               </a:extLst>
             </p:cNvPr>
@@ -3490,18 +3702,18 @@
           </p:nvGrpSpPr>
           <p:grpSpPr>
             <a:xfrm>
-              <a:off x="5628186" y="809624"/>
-              <a:ext cx="665161" cy="369332"/>
-              <a:chOff x="5487401" y="1855555"/>
-              <a:chExt cx="665161" cy="369332"/>
+              <a:off x="4780578" y="2313001"/>
+              <a:ext cx="1943415" cy="840447"/>
+              <a:chOff x="4780578" y="2313001"/>
+              <a:chExt cx="1943415" cy="840447"/>
             </a:xfrm>
           </p:grpSpPr>
           <p:sp>
             <p:nvSpPr>
-              <p:cNvPr id="12" name="Rectangle 11">
+              <p:cNvPr id="22" name="Arrow: Right 21">
                 <a:extLst>
                   <a:ext uri="{FF2B5EF4-FFF2-40B4-BE49-F238E27FC236}">
-                    <a16:creationId xmlns:a16="http://schemas.microsoft.com/office/drawing/2014/main" id="{3C0FFBD2-FA58-4887-A4A2-5D09D8C6BDEA}"/>
+                    <a16:creationId xmlns:a16="http://schemas.microsoft.com/office/drawing/2014/main" id="{1A69C996-906E-478A-AB85-47116E1A0887}"/>
                   </a:ext>
                 </a:extLst>
               </p:cNvPr>
@@ -3510,47 +3722,30 @@
             </p:nvSpPr>
             <p:spPr>
               <a:xfrm>
-                <a:off x="5487401" y="1919329"/>
-                <a:ext cx="608599" cy="277278"/>
+                <a:off x="4815301" y="2636599"/>
+                <a:ext cx="1908692" cy="516849"/>
               </a:xfrm>
-              <a:prstGeom prst="rect">
-                <a:avLst/>
+              <a:prstGeom prst="rightArrow">
+                <a:avLst>
+                  <a:gd name="adj1" fmla="val 46352"/>
+                  <a:gd name="adj2" fmla="val 50000"/>
+                </a:avLst>
               </a:prstGeom>
-              <a:ln>
-                <a:noFill/>
-              </a:ln>
-              <a:effectLst>
-                <a:outerShdw blurRad="107950" dist="12700" dir="5400000" algn="ctr">
-                  <a:srgbClr val="000000"/>
-                </a:outerShdw>
-              </a:effectLst>
-              <a:scene3d>
-                <a:camera prst="orthographicFront">
-                  <a:rot lat="0" lon="0" rev="0"/>
-                </a:camera>
-                <a:lightRig rig="soft" dir="t">
-                  <a:rot lat="0" lon="0" rev="0"/>
-                </a:lightRig>
-              </a:scene3d>
-              <a:sp3d contourW="44450" prstMaterial="matte">
-                <a:bevelT w="63500" h="63500" prst="artDeco"/>
-                <a:contourClr>
-                  <a:srgbClr val="FFFFFF"/>
-                </a:contourClr>
-              </a:sp3d>
             </p:spPr>
             <p:style>
               <a:lnRef idx="2">
-                <a:schemeClr val="dk1"/>
+                <a:schemeClr val="accent1">
+                  <a:shade val="50000"/>
+                </a:schemeClr>
               </a:lnRef>
               <a:fillRef idx="1">
-                <a:schemeClr val="lt1"/>
+                <a:schemeClr val="accent1"/>
               </a:fillRef>
               <a:effectRef idx="0">
-                <a:schemeClr val="dk1"/>
+                <a:schemeClr val="accent1"/>
               </a:effectRef>
               <a:fontRef idx="minor">
-                <a:schemeClr val="dk1"/>
+                <a:schemeClr val="lt1"/>
               </a:fontRef>
             </p:style>
             <p:txBody>
@@ -3564,10 +3759,10 @@
           </p:sp>
           <p:sp>
             <p:nvSpPr>
-              <p:cNvPr id="13" name="TextBox 12">
+              <p:cNvPr id="23" name="TextBox 22">
                 <a:extLst>
                   <a:ext uri="{FF2B5EF4-FFF2-40B4-BE49-F238E27FC236}">
-                    <a16:creationId xmlns:a16="http://schemas.microsoft.com/office/drawing/2014/main" id="{99416ED0-FAF5-40B3-AB54-F7283173CFCA}"/>
+                    <a16:creationId xmlns:a16="http://schemas.microsoft.com/office/drawing/2014/main" id="{D45D8121-0650-4768-96CD-D98AC1B73B6C}"/>
                   </a:ext>
                 </a:extLst>
               </p:cNvPr>
@@ -3576,8 +3771,8 @@
             </p:nvSpPr>
             <p:spPr>
               <a:xfrm>
-                <a:off x="5544553" y="1855555"/>
-                <a:ext cx="608009" cy="369332"/>
+                <a:off x="4780578" y="2330748"/>
+                <a:ext cx="697583" cy="369332"/>
               </a:xfrm>
               <a:prstGeom prst="rect">
                 <a:avLst/>
@@ -3592,88 +3787,140 @@
               <a:p>
                 <a:r>
                   <a:rPr lang="en-SG" dirty="0"/>
-                  <a:t>Tab</a:t>
+                  <a:t>Press</a:t>
                 </a:r>
               </a:p>
             </p:txBody>
           </p:sp>
+          <p:grpSp>
+            <p:nvGrpSpPr>
+              <p:cNvPr id="27" name="Group 26">
+                <a:extLst>
+                  <a:ext uri="{FF2B5EF4-FFF2-40B4-BE49-F238E27FC236}">
+                    <a16:creationId xmlns:a16="http://schemas.microsoft.com/office/drawing/2014/main" id="{E427D93D-F745-4CDB-B79A-E115AC26168E}"/>
+                  </a:ext>
+                </a:extLst>
+              </p:cNvPr>
+              <p:cNvGrpSpPr/>
+              <p:nvPr/>
+            </p:nvGrpSpPr>
+            <p:grpSpPr>
+              <a:xfrm>
+                <a:off x="5491022" y="2313001"/>
+                <a:ext cx="917735" cy="369332"/>
+                <a:chOff x="5485946" y="3275526"/>
+                <a:chExt cx="917735" cy="369332"/>
+              </a:xfrm>
+            </p:grpSpPr>
+            <p:sp>
+              <p:nvSpPr>
+                <p:cNvPr id="25" name="Rectangle 24">
+                  <a:extLst>
+                    <a:ext uri="{FF2B5EF4-FFF2-40B4-BE49-F238E27FC236}">
+                      <a16:creationId xmlns:a16="http://schemas.microsoft.com/office/drawing/2014/main" id="{8C8BB293-452E-467B-9DCF-1256886BA6F4}"/>
+                    </a:ext>
+                  </a:extLst>
+                </p:cNvPr>
+                <p:cNvSpPr/>
+                <p:nvPr/>
+              </p:nvSpPr>
+              <p:spPr>
+                <a:xfrm>
+                  <a:off x="5485946" y="3339300"/>
+                  <a:ext cx="828494" cy="277278"/>
+                </a:xfrm>
+                <a:prstGeom prst="rect">
+                  <a:avLst/>
+                </a:prstGeom>
+                <a:ln>
+                  <a:noFill/>
+                </a:ln>
+                <a:effectLst>
+                  <a:outerShdw blurRad="107950" dist="12700" dir="5400000" algn="ctr">
+                    <a:srgbClr val="000000"/>
+                  </a:outerShdw>
+                </a:effectLst>
+                <a:scene3d>
+                  <a:camera prst="orthographicFront">
+                    <a:rot lat="0" lon="0" rev="0"/>
+                  </a:camera>
+                  <a:lightRig rig="soft" dir="t">
+                    <a:rot lat="0" lon="0" rev="0"/>
+                  </a:lightRig>
+                </a:scene3d>
+                <a:sp3d contourW="44450" prstMaterial="matte">
+                  <a:bevelT w="63500" h="63500" prst="artDeco"/>
+                  <a:contourClr>
+                    <a:srgbClr val="FFFFFF"/>
+                  </a:contourClr>
+                </a:sp3d>
+              </p:spPr>
+              <p:style>
+                <a:lnRef idx="2">
+                  <a:schemeClr val="dk1"/>
+                </a:lnRef>
+                <a:fillRef idx="1">
+                  <a:schemeClr val="lt1"/>
+                </a:fillRef>
+                <a:effectRef idx="0">
+                  <a:schemeClr val="dk1"/>
+                </a:effectRef>
+                <a:fontRef idx="minor">
+                  <a:schemeClr val="dk1"/>
+                </a:fontRef>
+              </p:style>
+              <p:txBody>
+                <a:bodyPr rtlCol="0" anchor="ctr"/>
+                <a:lstStyle/>
+                <a:p>
+                  <a:pPr algn="ctr"/>
+                  <a:endParaRPr lang="en-SG"/>
+                </a:p>
+              </p:txBody>
+            </p:sp>
+            <p:sp>
+              <p:nvSpPr>
+                <p:cNvPr id="26" name="TextBox 25">
+                  <a:extLst>
+                    <a:ext uri="{FF2B5EF4-FFF2-40B4-BE49-F238E27FC236}">
+                      <a16:creationId xmlns:a16="http://schemas.microsoft.com/office/drawing/2014/main" id="{26C4930D-0549-43F1-9DA5-C7AD4E5D0553}"/>
+                    </a:ext>
+                  </a:extLst>
+                </p:cNvPr>
+                <p:cNvSpPr txBox="1"/>
+                <p:nvPr/>
+              </p:nvSpPr>
+              <p:spPr>
+                <a:xfrm>
+                  <a:off x="5502571" y="3275526"/>
+                  <a:ext cx="901110" cy="369332"/>
+                </a:xfrm>
+                <a:prstGeom prst="rect">
+                  <a:avLst/>
+                </a:prstGeom>
+                <a:noFill/>
+              </p:spPr>
+              <p:txBody>
+                <a:bodyPr wrap="square" rtlCol="0">
+                  <a:spAutoFit/>
+                </a:bodyPr>
+                <a:lstStyle/>
+                <a:p>
+                  <a:r>
+                    <a:rPr lang="en-SG" dirty="0"/>
+                    <a:t>Delete</a:t>
+                  </a:r>
+                </a:p>
+              </p:txBody>
+            </p:sp>
+          </p:grpSp>
         </p:grpSp>
-        <p:sp>
-          <p:nvSpPr>
-            <p:cNvPr id="28" name="Arrow: Right 27">
+        <p:pic>
+          <p:nvPicPr>
+            <p:cNvPr id="10" name="Picture 9">
               <a:extLst>
                 <a:ext uri="{FF2B5EF4-FFF2-40B4-BE49-F238E27FC236}">
-                  <a16:creationId xmlns:a16="http://schemas.microsoft.com/office/drawing/2014/main" id="{04C2CCCD-DF08-432C-834E-0170D56523AC}"/>
-                </a:ext>
-              </a:extLst>
-            </p:cNvPr>
-            <p:cNvSpPr/>
-            <p:nvPr/>
-          </p:nvSpPr>
-          <p:spPr>
-            <a:xfrm>
-              <a:off x="4775502" y="1135178"/>
-              <a:ext cx="1908692" cy="516849"/>
-            </a:xfrm>
-            <a:prstGeom prst="rightArrow">
-              <a:avLst>
-                <a:gd name="adj1" fmla="val 46352"/>
-                <a:gd name="adj2" fmla="val 50000"/>
-              </a:avLst>
-            </a:prstGeom>
-          </p:spPr>
-          <p:style>
-            <a:lnRef idx="2">
-              <a:schemeClr val="accent1">
-                <a:shade val="50000"/>
-              </a:schemeClr>
-            </a:lnRef>
-            <a:fillRef idx="1">
-              <a:schemeClr val="accent1"/>
-            </a:fillRef>
-            <a:effectRef idx="0">
-              <a:schemeClr val="accent1"/>
-            </a:effectRef>
-            <a:fontRef idx="minor">
-              <a:schemeClr val="lt1"/>
-            </a:fontRef>
-          </p:style>
-          <p:txBody>
-            <a:bodyPr rtlCol="0" anchor="ctr"/>
-            <a:lstStyle/>
-            <a:p>
-              <a:pPr algn="ctr"/>
-              <a:endParaRPr lang="en-SG"/>
-            </a:p>
-          </p:txBody>
-        </p:sp>
-      </p:grpSp>
-      <p:grpSp>
-        <p:nvGrpSpPr>
-          <p:cNvPr id="55" name="Group 54">
-            <a:extLst>
-              <a:ext uri="{FF2B5EF4-FFF2-40B4-BE49-F238E27FC236}">
-                <a16:creationId xmlns:a16="http://schemas.microsoft.com/office/drawing/2014/main" id="{DFB724A4-E88C-41CC-8E17-0481FE82D15D}"/>
-              </a:ext>
-            </a:extLst>
-          </p:cNvPr>
-          <p:cNvGrpSpPr/>
-          <p:nvPr/>
-        </p:nvGrpSpPr>
-        <p:grpSpPr>
-          <a:xfrm>
-            <a:off x="1311370" y="2313001"/>
-            <a:ext cx="8628556" cy="865182"/>
-            <a:chOff x="1311370" y="2313001"/>
-            <a:chExt cx="8628556" cy="865182"/>
-          </a:xfrm>
-        </p:grpSpPr>
-        <p:pic>
-          <p:nvPicPr>
-            <p:cNvPr id="9" name="Picture 8">
-              <a:extLst>
-                <a:ext uri="{FF2B5EF4-FFF2-40B4-BE49-F238E27FC236}">
-                  <a16:creationId xmlns:a16="http://schemas.microsoft.com/office/drawing/2014/main" id="{01440BCE-5897-49BE-8883-35788BCEF290}"/>
+                  <a16:creationId xmlns:a16="http://schemas.microsoft.com/office/drawing/2014/main" id="{947EB6A8-E7E7-412D-A4CC-DAF2462169AE}"/>
                 </a:ext>
               </a:extLst>
             </p:cNvPr>
@@ -3696,226 +3943,20 @@
           </p:blipFill>
           <p:spPr>
             <a:xfrm>
-              <a:off x="6961212" y="2636599"/>
-              <a:ext cx="2978714" cy="541584"/>
+              <a:off x="7148296" y="2632502"/>
+              <a:ext cx="2438624" cy="520945"/>
             </a:xfrm>
             <a:prstGeom prst="rect">
               <a:avLst/>
             </a:prstGeom>
           </p:spPr>
         </p:pic>
-        <p:sp>
-          <p:nvSpPr>
-            <p:cNvPr id="22" name="Arrow: Right 21">
+        <p:pic>
+          <p:nvPicPr>
+            <p:cNvPr id="36" name="Picture 35">
               <a:extLst>
                 <a:ext uri="{FF2B5EF4-FFF2-40B4-BE49-F238E27FC236}">
-                  <a16:creationId xmlns:a16="http://schemas.microsoft.com/office/drawing/2014/main" id="{1A69C996-906E-478A-AB85-47116E1A0887}"/>
-                </a:ext>
-              </a:extLst>
-            </p:cNvPr>
-            <p:cNvSpPr/>
-            <p:nvPr/>
-          </p:nvSpPr>
-          <p:spPr>
-            <a:xfrm>
-              <a:off x="4815301" y="2636599"/>
-              <a:ext cx="1908692" cy="516849"/>
-            </a:xfrm>
-            <a:prstGeom prst="rightArrow">
-              <a:avLst>
-                <a:gd name="adj1" fmla="val 46352"/>
-                <a:gd name="adj2" fmla="val 50000"/>
-              </a:avLst>
-            </a:prstGeom>
-          </p:spPr>
-          <p:style>
-            <a:lnRef idx="2">
-              <a:schemeClr val="accent1">
-                <a:shade val="50000"/>
-              </a:schemeClr>
-            </a:lnRef>
-            <a:fillRef idx="1">
-              <a:schemeClr val="accent1"/>
-            </a:fillRef>
-            <a:effectRef idx="0">
-              <a:schemeClr val="accent1"/>
-            </a:effectRef>
-            <a:fontRef idx="minor">
-              <a:schemeClr val="lt1"/>
-            </a:fontRef>
-          </p:style>
-          <p:txBody>
-            <a:bodyPr rtlCol="0" anchor="ctr"/>
-            <a:lstStyle/>
-            <a:p>
-              <a:pPr algn="ctr"/>
-              <a:endParaRPr lang="en-SG"/>
-            </a:p>
-          </p:txBody>
-        </p:sp>
-        <p:sp>
-          <p:nvSpPr>
-            <p:cNvPr id="23" name="TextBox 22">
-              <a:extLst>
-                <a:ext uri="{FF2B5EF4-FFF2-40B4-BE49-F238E27FC236}">
-                  <a16:creationId xmlns:a16="http://schemas.microsoft.com/office/drawing/2014/main" id="{D45D8121-0650-4768-96CD-D98AC1B73B6C}"/>
-                </a:ext>
-              </a:extLst>
-            </p:cNvPr>
-            <p:cNvSpPr txBox="1"/>
-            <p:nvPr/>
-          </p:nvSpPr>
-          <p:spPr>
-            <a:xfrm>
-              <a:off x="4780578" y="2330748"/>
-              <a:ext cx="697583" cy="369332"/>
-            </a:xfrm>
-            <a:prstGeom prst="rect">
-              <a:avLst/>
-            </a:prstGeom>
-            <a:noFill/>
-          </p:spPr>
-          <p:txBody>
-            <a:bodyPr wrap="square" rtlCol="0">
-              <a:spAutoFit/>
-            </a:bodyPr>
-            <a:lstStyle/>
-            <a:p>
-              <a:r>
-                <a:rPr lang="en-SG" dirty="0"/>
-                <a:t>Press</a:t>
-              </a:r>
-            </a:p>
-          </p:txBody>
-        </p:sp>
-        <p:grpSp>
-          <p:nvGrpSpPr>
-            <p:cNvPr id="27" name="Group 26">
-              <a:extLst>
-                <a:ext uri="{FF2B5EF4-FFF2-40B4-BE49-F238E27FC236}">
-                  <a16:creationId xmlns:a16="http://schemas.microsoft.com/office/drawing/2014/main" id="{E427D93D-F745-4CDB-B79A-E115AC26168E}"/>
-                </a:ext>
-              </a:extLst>
-            </p:cNvPr>
-            <p:cNvGrpSpPr/>
-            <p:nvPr/>
-          </p:nvGrpSpPr>
-          <p:grpSpPr>
-            <a:xfrm>
-              <a:off x="5491022" y="2313001"/>
-              <a:ext cx="917735" cy="369332"/>
-              <a:chOff x="5485946" y="3275526"/>
-              <a:chExt cx="917735" cy="369332"/>
-            </a:xfrm>
-          </p:grpSpPr>
-          <p:sp>
-            <p:nvSpPr>
-              <p:cNvPr id="25" name="Rectangle 24">
-                <a:extLst>
-                  <a:ext uri="{FF2B5EF4-FFF2-40B4-BE49-F238E27FC236}">
-                    <a16:creationId xmlns:a16="http://schemas.microsoft.com/office/drawing/2014/main" id="{8C8BB293-452E-467B-9DCF-1256886BA6F4}"/>
-                  </a:ext>
-                </a:extLst>
-              </p:cNvPr>
-              <p:cNvSpPr/>
-              <p:nvPr/>
-            </p:nvSpPr>
-            <p:spPr>
-              <a:xfrm>
-                <a:off x="5485946" y="3339300"/>
-                <a:ext cx="828494" cy="277278"/>
-              </a:xfrm>
-              <a:prstGeom prst="rect">
-                <a:avLst/>
-              </a:prstGeom>
-              <a:ln>
-                <a:noFill/>
-              </a:ln>
-              <a:effectLst>
-                <a:outerShdw blurRad="107950" dist="12700" dir="5400000" algn="ctr">
-                  <a:srgbClr val="000000"/>
-                </a:outerShdw>
-              </a:effectLst>
-              <a:scene3d>
-                <a:camera prst="orthographicFront">
-                  <a:rot lat="0" lon="0" rev="0"/>
-                </a:camera>
-                <a:lightRig rig="soft" dir="t">
-                  <a:rot lat="0" lon="0" rev="0"/>
-                </a:lightRig>
-              </a:scene3d>
-              <a:sp3d contourW="44450" prstMaterial="matte">
-                <a:bevelT w="63500" h="63500" prst="artDeco"/>
-                <a:contourClr>
-                  <a:srgbClr val="FFFFFF"/>
-                </a:contourClr>
-              </a:sp3d>
-            </p:spPr>
-            <p:style>
-              <a:lnRef idx="2">
-                <a:schemeClr val="dk1"/>
-              </a:lnRef>
-              <a:fillRef idx="1">
-                <a:schemeClr val="lt1"/>
-              </a:fillRef>
-              <a:effectRef idx="0">
-                <a:schemeClr val="dk1"/>
-              </a:effectRef>
-              <a:fontRef idx="minor">
-                <a:schemeClr val="dk1"/>
-              </a:fontRef>
-            </p:style>
-            <p:txBody>
-              <a:bodyPr rtlCol="0" anchor="ctr"/>
-              <a:lstStyle/>
-              <a:p>
-                <a:pPr algn="ctr"/>
-                <a:endParaRPr lang="en-SG"/>
-              </a:p>
-            </p:txBody>
-          </p:sp>
-          <p:sp>
-            <p:nvSpPr>
-              <p:cNvPr id="26" name="TextBox 25">
-                <a:extLst>
-                  <a:ext uri="{FF2B5EF4-FFF2-40B4-BE49-F238E27FC236}">
-                    <a16:creationId xmlns:a16="http://schemas.microsoft.com/office/drawing/2014/main" id="{26C4930D-0549-43F1-9DA5-C7AD4E5D0553}"/>
-                  </a:ext>
-                </a:extLst>
-              </p:cNvPr>
-              <p:cNvSpPr txBox="1"/>
-              <p:nvPr/>
-            </p:nvSpPr>
-            <p:spPr>
-              <a:xfrm>
-                <a:off x="5502571" y="3275526"/>
-                <a:ext cx="901110" cy="369332"/>
-              </a:xfrm>
-              <a:prstGeom prst="rect">
-                <a:avLst/>
-              </a:prstGeom>
-              <a:noFill/>
-            </p:spPr>
-            <p:txBody>
-              <a:bodyPr wrap="square" rtlCol="0">
-                <a:spAutoFit/>
-              </a:bodyPr>
-              <a:lstStyle/>
-              <a:p>
-                <a:r>
-                  <a:rPr lang="en-SG" dirty="0"/>
-                  <a:t>Delete</a:t>
-                </a:r>
-              </a:p>
-            </p:txBody>
-          </p:sp>
-        </p:grpSp>
-        <p:pic>
-          <p:nvPicPr>
-            <p:cNvPr id="54" name="Picture 53">
-              <a:extLst>
-                <a:ext uri="{FF2B5EF4-FFF2-40B4-BE49-F238E27FC236}">
-                  <a16:creationId xmlns:a16="http://schemas.microsoft.com/office/drawing/2014/main" id="{58045EC6-FF0A-4C18-9AA6-A2DD6453154C}"/>
+                  <a16:creationId xmlns:a16="http://schemas.microsoft.com/office/drawing/2014/main" id="{35BD77D4-5E47-4E8A-9243-54239DA9899A}"/>
                 </a:ext>
               </a:extLst>
             </p:cNvPr>
@@ -3938,8 +3979,8 @@
           </p:blipFill>
           <p:spPr>
             <a:xfrm>
-              <a:off x="1311370" y="2595899"/>
-              <a:ext cx="3005106" cy="520687"/>
+              <a:off x="1626585" y="2636598"/>
+              <a:ext cx="2678214" cy="516849"/>
             </a:xfrm>
             <a:prstGeom prst="rect">
               <a:avLst/>
@@ -3949,10 +3990,10 @@
       </p:grpSp>
       <p:grpSp>
         <p:nvGrpSpPr>
-          <p:cNvPr id="4" name="Group 3">
+          <p:cNvPr id="29" name="Group 28">
             <a:extLst>
               <a:ext uri="{FF2B5EF4-FFF2-40B4-BE49-F238E27FC236}">
-                <a16:creationId xmlns:a16="http://schemas.microsoft.com/office/drawing/2014/main" id="{354A0DCA-1D94-497C-A8C7-54966229A342}"/>
+                <a16:creationId xmlns:a16="http://schemas.microsoft.com/office/drawing/2014/main" id="{A021EC56-C8FF-4457-83E2-3CB82F4F936D}"/>
               </a:ext>
             </a:extLst>
           </p:cNvPr>
@@ -3961,18 +4002,281 @@
         </p:nvGrpSpPr>
         <p:grpSpPr>
           <a:xfrm>
-            <a:off x="1316446" y="3931467"/>
-            <a:ext cx="8629807" cy="846241"/>
-            <a:chOff x="1316446" y="3931467"/>
-            <a:chExt cx="8629807" cy="846241"/>
+            <a:off x="1754646" y="3931467"/>
+            <a:ext cx="8123435" cy="842403"/>
+            <a:chOff x="1754646" y="3931467"/>
+            <a:chExt cx="8123435" cy="842403"/>
           </a:xfrm>
         </p:grpSpPr>
+        <p:grpSp>
+          <p:nvGrpSpPr>
+            <p:cNvPr id="4" name="Group 3">
+              <a:extLst>
+                <a:ext uri="{FF2B5EF4-FFF2-40B4-BE49-F238E27FC236}">
+                  <a16:creationId xmlns:a16="http://schemas.microsoft.com/office/drawing/2014/main" id="{354A0DCA-1D94-497C-A8C7-54966229A342}"/>
+                </a:ext>
+              </a:extLst>
+            </p:cNvPr>
+            <p:cNvGrpSpPr/>
+            <p:nvPr/>
+          </p:nvGrpSpPr>
+          <p:grpSpPr>
+            <a:xfrm>
+              <a:off x="4772793" y="3931467"/>
+              <a:ext cx="1908692" cy="842403"/>
+              <a:chOff x="4772793" y="3931467"/>
+              <a:chExt cx="1908692" cy="842403"/>
+            </a:xfrm>
+          </p:grpSpPr>
+          <p:sp>
+            <p:nvSpPr>
+              <p:cNvPr id="44" name="TextBox 43">
+                <a:extLst>
+                  <a:ext uri="{FF2B5EF4-FFF2-40B4-BE49-F238E27FC236}">
+                    <a16:creationId xmlns:a16="http://schemas.microsoft.com/office/drawing/2014/main" id="{14F47AAA-8A46-4C5D-9F3E-30E83410B82D}"/>
+                  </a:ext>
+                </a:extLst>
+              </p:cNvPr>
+              <p:cNvSpPr txBox="1"/>
+              <p:nvPr/>
+            </p:nvSpPr>
+            <p:spPr>
+              <a:xfrm>
+                <a:off x="4915033" y="3949214"/>
+                <a:ext cx="697583" cy="369332"/>
+              </a:xfrm>
+              <a:prstGeom prst="rect">
+                <a:avLst/>
+              </a:prstGeom>
+              <a:noFill/>
+            </p:spPr>
+            <p:txBody>
+              <a:bodyPr wrap="square" rtlCol="0">
+                <a:spAutoFit/>
+              </a:bodyPr>
+              <a:lstStyle/>
+              <a:p>
+                <a:r>
+                  <a:rPr lang="en-SG" dirty="0"/>
+                  <a:t>Press</a:t>
+                </a:r>
+              </a:p>
+            </p:txBody>
+          </p:sp>
+          <p:grpSp>
+            <p:nvGrpSpPr>
+              <p:cNvPr id="45" name="Group 44">
+                <a:extLst>
+                  <a:ext uri="{FF2B5EF4-FFF2-40B4-BE49-F238E27FC236}">
+                    <a16:creationId xmlns:a16="http://schemas.microsoft.com/office/drawing/2014/main" id="{F4DD8D73-ADE3-4405-9BDD-CF4238CBE215}"/>
+                  </a:ext>
+                </a:extLst>
+              </p:cNvPr>
+              <p:cNvGrpSpPr/>
+              <p:nvPr/>
+            </p:nvGrpSpPr>
+            <p:grpSpPr>
+              <a:xfrm>
+                <a:off x="5625477" y="3931467"/>
+                <a:ext cx="665161" cy="369332"/>
+                <a:chOff x="5487401" y="1855555"/>
+                <a:chExt cx="665161" cy="369332"/>
+              </a:xfrm>
+            </p:grpSpPr>
+            <p:sp>
+              <p:nvSpPr>
+                <p:cNvPr id="47" name="Rectangle 46">
+                  <a:extLst>
+                    <a:ext uri="{FF2B5EF4-FFF2-40B4-BE49-F238E27FC236}">
+                      <a16:creationId xmlns:a16="http://schemas.microsoft.com/office/drawing/2014/main" id="{CE2AF899-420B-49E2-B69B-D8AA23B2DAD3}"/>
+                    </a:ext>
+                  </a:extLst>
+                </p:cNvPr>
+                <p:cNvSpPr/>
+                <p:nvPr/>
+              </p:nvSpPr>
+              <p:spPr>
+                <a:xfrm>
+                  <a:off x="5487401" y="1919329"/>
+                  <a:ext cx="608599" cy="277278"/>
+                </a:xfrm>
+                <a:prstGeom prst="rect">
+                  <a:avLst/>
+                </a:prstGeom>
+                <a:ln>
+                  <a:noFill/>
+                </a:ln>
+                <a:effectLst>
+                  <a:outerShdw blurRad="107950" dist="12700" dir="5400000" algn="ctr">
+                    <a:srgbClr val="000000"/>
+                  </a:outerShdw>
+                </a:effectLst>
+                <a:scene3d>
+                  <a:camera prst="orthographicFront">
+                    <a:rot lat="0" lon="0" rev="0"/>
+                  </a:camera>
+                  <a:lightRig rig="soft" dir="t">
+                    <a:rot lat="0" lon="0" rev="0"/>
+                  </a:lightRig>
+                </a:scene3d>
+                <a:sp3d contourW="44450" prstMaterial="matte">
+                  <a:bevelT w="63500" h="63500" prst="artDeco"/>
+                  <a:contourClr>
+                    <a:srgbClr val="FFFFFF"/>
+                  </a:contourClr>
+                </a:sp3d>
+              </p:spPr>
+              <p:style>
+                <a:lnRef idx="2">
+                  <a:schemeClr val="dk1"/>
+                </a:lnRef>
+                <a:fillRef idx="1">
+                  <a:schemeClr val="lt1"/>
+                </a:fillRef>
+                <a:effectRef idx="0">
+                  <a:schemeClr val="dk1"/>
+                </a:effectRef>
+                <a:fontRef idx="minor">
+                  <a:schemeClr val="dk1"/>
+                </a:fontRef>
+              </p:style>
+              <p:txBody>
+                <a:bodyPr rtlCol="0" anchor="ctr"/>
+                <a:lstStyle/>
+                <a:p>
+                  <a:pPr algn="ctr"/>
+                  <a:endParaRPr lang="en-SG"/>
+                </a:p>
+              </p:txBody>
+            </p:sp>
+            <p:sp>
+              <p:nvSpPr>
+                <p:cNvPr id="48" name="TextBox 47">
+                  <a:extLst>
+                    <a:ext uri="{FF2B5EF4-FFF2-40B4-BE49-F238E27FC236}">
+                      <a16:creationId xmlns:a16="http://schemas.microsoft.com/office/drawing/2014/main" id="{902C4550-399A-4E15-B30C-B6074B8FA516}"/>
+                    </a:ext>
+                  </a:extLst>
+                </p:cNvPr>
+                <p:cNvSpPr txBox="1"/>
+                <p:nvPr/>
+              </p:nvSpPr>
+              <p:spPr>
+                <a:xfrm>
+                  <a:off x="5544553" y="1855555"/>
+                  <a:ext cx="608009" cy="369332"/>
+                </a:xfrm>
+                <a:prstGeom prst="rect">
+                  <a:avLst/>
+                </a:prstGeom>
+                <a:noFill/>
+              </p:spPr>
+              <p:txBody>
+                <a:bodyPr wrap="square" rtlCol="0">
+                  <a:spAutoFit/>
+                </a:bodyPr>
+                <a:lstStyle/>
+                <a:p>
+                  <a:r>
+                    <a:rPr lang="en-SG" dirty="0"/>
+                    <a:t>Tab</a:t>
+                  </a:r>
+                </a:p>
+              </p:txBody>
+            </p:sp>
+          </p:grpSp>
+          <p:sp>
+            <p:nvSpPr>
+              <p:cNvPr id="46" name="Arrow: Right 45">
+                <a:extLst>
+                  <a:ext uri="{FF2B5EF4-FFF2-40B4-BE49-F238E27FC236}">
+                    <a16:creationId xmlns:a16="http://schemas.microsoft.com/office/drawing/2014/main" id="{B44396F8-0987-4A76-9433-73D0623AE705}"/>
+                  </a:ext>
+                </a:extLst>
+              </p:cNvPr>
+              <p:cNvSpPr/>
+              <p:nvPr/>
+            </p:nvSpPr>
+            <p:spPr>
+              <a:xfrm>
+                <a:off x="4772793" y="4257021"/>
+                <a:ext cx="1908692" cy="516849"/>
+              </a:xfrm>
+              <a:prstGeom prst="rightArrow">
+                <a:avLst>
+                  <a:gd name="adj1" fmla="val 46352"/>
+                  <a:gd name="adj2" fmla="val 50000"/>
+                </a:avLst>
+              </a:prstGeom>
+            </p:spPr>
+            <p:style>
+              <a:lnRef idx="2">
+                <a:schemeClr val="accent1">
+                  <a:shade val="50000"/>
+                </a:schemeClr>
+              </a:lnRef>
+              <a:fillRef idx="1">
+                <a:schemeClr val="accent1"/>
+              </a:fillRef>
+              <a:effectRef idx="0">
+                <a:schemeClr val="accent1"/>
+              </a:effectRef>
+              <a:fontRef idx="minor">
+                <a:schemeClr val="lt1"/>
+              </a:fontRef>
+            </p:style>
+            <p:txBody>
+              <a:bodyPr rtlCol="0" anchor="ctr"/>
+              <a:lstStyle/>
+              <a:p>
+                <a:pPr algn="ctr"/>
+                <a:endParaRPr lang="en-SG"/>
+              </a:p>
+            </p:txBody>
+          </p:sp>
+        </p:grpSp>
         <p:pic>
           <p:nvPicPr>
-            <p:cNvPr id="43" name="Picture 42">
+            <p:cNvPr id="16" name="Picture 15">
               <a:extLst>
                 <a:ext uri="{FF2B5EF4-FFF2-40B4-BE49-F238E27FC236}">
-                  <a16:creationId xmlns:a16="http://schemas.microsoft.com/office/drawing/2014/main" id="{F32DD6C8-156A-4F8D-AC27-3EBCC9647971}"/>
+                  <a16:creationId xmlns:a16="http://schemas.microsoft.com/office/drawing/2014/main" id="{9DD918A6-A50B-4384-87A7-0326A4755887}"/>
+                </a:ext>
+              </a:extLst>
+            </p:cNvPr>
+            <p:cNvPicPr>
+              <a:picLocks noChangeAspect="1"/>
+            </p:cNvPicPr>
+            <p:nvPr/>
+          </p:nvPicPr>
+          <p:blipFill>
+            <a:blip r:embed="rId5">
+              <a:extLst>
+                <a:ext uri="{28A0092B-C50C-407E-A947-70E740481C1C}">
+                  <a14:useLocalDpi xmlns:a14="http://schemas.microsoft.com/office/drawing/2010/main" val="0"/>
+                </a:ext>
+              </a:extLst>
+            </a:blip>
+            <a:stretch>
+              <a:fillRect/>
+            </a:stretch>
+          </p:blipFill>
+          <p:spPr>
+            <a:xfrm>
+              <a:off x="7072332" y="4204126"/>
+              <a:ext cx="2805749" cy="516849"/>
+            </a:xfrm>
+            <a:prstGeom prst="rect">
+              <a:avLst/>
+            </a:prstGeom>
+          </p:spPr>
+        </p:pic>
+        <p:pic>
+          <p:nvPicPr>
+            <p:cNvPr id="37" name="Picture 36">
+              <a:extLst>
+                <a:ext uri="{FF2B5EF4-FFF2-40B4-BE49-F238E27FC236}">
+                  <a16:creationId xmlns:a16="http://schemas.microsoft.com/office/drawing/2014/main" id="{550F0E15-1649-4851-9CD9-7095AE10C5EA}"/>
                 </a:ext>
               </a:extLst>
             </p:cNvPr>
@@ -3995,249 +4299,8 @@
           </p:blipFill>
           <p:spPr>
             <a:xfrm>
-              <a:off x="1316446" y="4257021"/>
-              <a:ext cx="3005106" cy="520687"/>
-            </a:xfrm>
-            <a:prstGeom prst="rect">
-              <a:avLst/>
-            </a:prstGeom>
-          </p:spPr>
-        </p:pic>
-        <p:sp>
-          <p:nvSpPr>
-            <p:cNvPr id="44" name="TextBox 43">
-              <a:extLst>
-                <a:ext uri="{FF2B5EF4-FFF2-40B4-BE49-F238E27FC236}">
-                  <a16:creationId xmlns:a16="http://schemas.microsoft.com/office/drawing/2014/main" id="{14F47AAA-8A46-4C5D-9F3E-30E83410B82D}"/>
-                </a:ext>
-              </a:extLst>
-            </p:cNvPr>
-            <p:cNvSpPr txBox="1"/>
-            <p:nvPr/>
-          </p:nvSpPr>
-          <p:spPr>
-            <a:xfrm>
-              <a:off x="4915033" y="3949214"/>
-              <a:ext cx="697583" cy="369332"/>
-            </a:xfrm>
-            <a:prstGeom prst="rect">
-              <a:avLst/>
-            </a:prstGeom>
-            <a:noFill/>
-          </p:spPr>
-          <p:txBody>
-            <a:bodyPr wrap="square" rtlCol="0">
-              <a:spAutoFit/>
-            </a:bodyPr>
-            <a:lstStyle/>
-            <a:p>
-              <a:r>
-                <a:rPr lang="en-SG" dirty="0"/>
-                <a:t>Press</a:t>
-              </a:r>
-            </a:p>
-          </p:txBody>
-        </p:sp>
-        <p:grpSp>
-          <p:nvGrpSpPr>
-            <p:cNvPr id="45" name="Group 44">
-              <a:extLst>
-                <a:ext uri="{FF2B5EF4-FFF2-40B4-BE49-F238E27FC236}">
-                  <a16:creationId xmlns:a16="http://schemas.microsoft.com/office/drawing/2014/main" id="{F4DD8D73-ADE3-4405-9BDD-CF4238CBE215}"/>
-                </a:ext>
-              </a:extLst>
-            </p:cNvPr>
-            <p:cNvGrpSpPr/>
-            <p:nvPr/>
-          </p:nvGrpSpPr>
-          <p:grpSpPr>
-            <a:xfrm>
-              <a:off x="5625477" y="3931467"/>
-              <a:ext cx="665161" cy="369332"/>
-              <a:chOff x="5487401" y="1855555"/>
-              <a:chExt cx="665161" cy="369332"/>
-            </a:xfrm>
-          </p:grpSpPr>
-          <p:sp>
-            <p:nvSpPr>
-              <p:cNvPr id="47" name="Rectangle 46">
-                <a:extLst>
-                  <a:ext uri="{FF2B5EF4-FFF2-40B4-BE49-F238E27FC236}">
-                    <a16:creationId xmlns:a16="http://schemas.microsoft.com/office/drawing/2014/main" id="{CE2AF899-420B-49E2-B69B-D8AA23B2DAD3}"/>
-                  </a:ext>
-                </a:extLst>
-              </p:cNvPr>
-              <p:cNvSpPr/>
-              <p:nvPr/>
-            </p:nvSpPr>
-            <p:spPr>
-              <a:xfrm>
-                <a:off x="5487401" y="1919329"/>
-                <a:ext cx="608599" cy="277278"/>
-              </a:xfrm>
-              <a:prstGeom prst="rect">
-                <a:avLst/>
-              </a:prstGeom>
-              <a:ln>
-                <a:noFill/>
-              </a:ln>
-              <a:effectLst>
-                <a:outerShdw blurRad="107950" dist="12700" dir="5400000" algn="ctr">
-                  <a:srgbClr val="000000"/>
-                </a:outerShdw>
-              </a:effectLst>
-              <a:scene3d>
-                <a:camera prst="orthographicFront">
-                  <a:rot lat="0" lon="0" rev="0"/>
-                </a:camera>
-                <a:lightRig rig="soft" dir="t">
-                  <a:rot lat="0" lon="0" rev="0"/>
-                </a:lightRig>
-              </a:scene3d>
-              <a:sp3d contourW="44450" prstMaterial="matte">
-                <a:bevelT w="63500" h="63500" prst="artDeco"/>
-                <a:contourClr>
-                  <a:srgbClr val="FFFFFF"/>
-                </a:contourClr>
-              </a:sp3d>
-            </p:spPr>
-            <p:style>
-              <a:lnRef idx="2">
-                <a:schemeClr val="dk1"/>
-              </a:lnRef>
-              <a:fillRef idx="1">
-                <a:schemeClr val="lt1"/>
-              </a:fillRef>
-              <a:effectRef idx="0">
-                <a:schemeClr val="dk1"/>
-              </a:effectRef>
-              <a:fontRef idx="minor">
-                <a:schemeClr val="dk1"/>
-              </a:fontRef>
-            </p:style>
-            <p:txBody>
-              <a:bodyPr rtlCol="0" anchor="ctr"/>
-              <a:lstStyle/>
-              <a:p>
-                <a:pPr algn="ctr"/>
-                <a:endParaRPr lang="en-SG"/>
-              </a:p>
-            </p:txBody>
-          </p:sp>
-          <p:sp>
-            <p:nvSpPr>
-              <p:cNvPr id="48" name="TextBox 47">
-                <a:extLst>
-                  <a:ext uri="{FF2B5EF4-FFF2-40B4-BE49-F238E27FC236}">
-                    <a16:creationId xmlns:a16="http://schemas.microsoft.com/office/drawing/2014/main" id="{902C4550-399A-4E15-B30C-B6074B8FA516}"/>
-                  </a:ext>
-                </a:extLst>
-              </p:cNvPr>
-              <p:cNvSpPr txBox="1"/>
-              <p:nvPr/>
-            </p:nvSpPr>
-            <p:spPr>
-              <a:xfrm>
-                <a:off x="5544553" y="1855555"/>
-                <a:ext cx="608009" cy="369332"/>
-              </a:xfrm>
-              <a:prstGeom prst="rect">
-                <a:avLst/>
-              </a:prstGeom>
-              <a:noFill/>
-            </p:spPr>
-            <p:txBody>
-              <a:bodyPr wrap="square" rtlCol="0">
-                <a:spAutoFit/>
-              </a:bodyPr>
-              <a:lstStyle/>
-              <a:p>
-                <a:r>
-                  <a:rPr lang="en-SG" dirty="0"/>
-                  <a:t>Tab</a:t>
-                </a:r>
-              </a:p>
-            </p:txBody>
-          </p:sp>
-        </p:grpSp>
-        <p:sp>
-          <p:nvSpPr>
-            <p:cNvPr id="46" name="Arrow: Right 45">
-              <a:extLst>
-                <a:ext uri="{FF2B5EF4-FFF2-40B4-BE49-F238E27FC236}">
-                  <a16:creationId xmlns:a16="http://schemas.microsoft.com/office/drawing/2014/main" id="{B44396F8-0987-4A76-9433-73D0623AE705}"/>
-                </a:ext>
-              </a:extLst>
-            </p:cNvPr>
-            <p:cNvSpPr/>
-            <p:nvPr/>
-          </p:nvSpPr>
-          <p:spPr>
-            <a:xfrm>
-              <a:off x="4772793" y="4257021"/>
-              <a:ext cx="1908692" cy="516849"/>
-            </a:xfrm>
-            <a:prstGeom prst="rightArrow">
-              <a:avLst>
-                <a:gd name="adj1" fmla="val 46352"/>
-                <a:gd name="adj2" fmla="val 50000"/>
-              </a:avLst>
-            </a:prstGeom>
-          </p:spPr>
-          <p:style>
-            <a:lnRef idx="2">
-              <a:schemeClr val="accent1">
-                <a:shade val="50000"/>
-              </a:schemeClr>
-            </a:lnRef>
-            <a:fillRef idx="1">
-              <a:schemeClr val="accent1"/>
-            </a:fillRef>
-            <a:effectRef idx="0">
-              <a:schemeClr val="accent1"/>
-            </a:effectRef>
-            <a:fontRef idx="minor">
-              <a:schemeClr val="lt1"/>
-            </a:fontRef>
-          </p:style>
-          <p:txBody>
-            <a:bodyPr rtlCol="0" anchor="ctr"/>
-            <a:lstStyle/>
-            <a:p>
-              <a:pPr algn="ctr"/>
-              <a:endParaRPr lang="en-SG"/>
-            </a:p>
-          </p:txBody>
-        </p:sp>
-        <p:pic>
-          <p:nvPicPr>
-            <p:cNvPr id="3" name="Picture 2">
-              <a:extLst>
-                <a:ext uri="{FF2B5EF4-FFF2-40B4-BE49-F238E27FC236}">
-                  <a16:creationId xmlns:a16="http://schemas.microsoft.com/office/drawing/2014/main" id="{B5C4DA8C-98C3-4456-B60E-8847C59A34F1}"/>
-                </a:ext>
-              </a:extLst>
-            </p:cNvPr>
-            <p:cNvPicPr>
-              <a:picLocks noChangeAspect="1"/>
-            </p:cNvPicPr>
-            <p:nvPr/>
-          </p:nvPicPr>
-          <p:blipFill rotWithShape="1">
-            <a:blip r:embed="rId5">
-              <a:extLst>
-                <a:ext uri="{28A0092B-C50C-407E-A947-70E740481C1C}">
-                  <a14:useLocalDpi xmlns:a14="http://schemas.microsoft.com/office/drawing/2010/main" val="0"/>
-                </a:ext>
-              </a:extLst>
-            </a:blip>
-            <a:srcRect t="8072" b="2227"/>
-            <a:stretch/>
-          </p:blipFill>
-          <p:spPr>
-            <a:xfrm>
-              <a:off x="6961212" y="4257021"/>
-              <a:ext cx="2985041" cy="480080"/>
+              <a:off x="1754646" y="4204126"/>
+              <a:ext cx="2627300" cy="507023"/>
             </a:xfrm>
             <a:prstGeom prst="rect">
               <a:avLst/>
@@ -4872,10 +4935,10 @@
       </p:grpSp>
       <p:grpSp>
         <p:nvGrpSpPr>
-          <p:cNvPr id="18" name="Group 17">
+          <p:cNvPr id="2" name="Group 1">
             <a:extLst>
               <a:ext uri="{FF2B5EF4-FFF2-40B4-BE49-F238E27FC236}">
-                <a16:creationId xmlns:a16="http://schemas.microsoft.com/office/drawing/2014/main" id="{B7CAF88F-48E9-4E3B-80EF-5B69CA464086}"/>
+                <a16:creationId xmlns:a16="http://schemas.microsoft.com/office/drawing/2014/main" id="{9512C225-E1C2-4FAE-84F4-D9A6304E6A65}"/>
               </a:ext>
             </a:extLst>
           </p:cNvPr>
@@ -4885,52 +4948,485 @@
         <p:grpSpPr>
           <a:xfrm>
             <a:off x="423069" y="1300760"/>
-            <a:ext cx="11553251" cy="848286"/>
-            <a:chOff x="356779" y="4082305"/>
-            <a:chExt cx="11553251" cy="848286"/>
+            <a:ext cx="11551308" cy="848286"/>
+            <a:chOff x="423069" y="1300760"/>
+            <a:chExt cx="11551308" cy="848286"/>
           </a:xfrm>
         </p:grpSpPr>
-        <p:pic>
-          <p:nvPicPr>
-            <p:cNvPr id="21" name="Picture 20">
+        <p:grpSp>
+          <p:nvGrpSpPr>
+            <p:cNvPr id="18" name="Group 17">
               <a:extLst>
                 <a:ext uri="{FF2B5EF4-FFF2-40B4-BE49-F238E27FC236}">
-                  <a16:creationId xmlns:a16="http://schemas.microsoft.com/office/drawing/2014/main" id="{67E4B6D4-FF6C-4EF1-87DB-AB18C75CA346}"/>
+                  <a16:creationId xmlns:a16="http://schemas.microsoft.com/office/drawing/2014/main" id="{B7CAF88F-48E9-4E3B-80EF-5B69CA464086}"/>
                 </a:ext>
               </a:extLst>
             </p:cNvPr>
-            <p:cNvPicPr>
-              <a:picLocks noChangeAspect="1"/>
-            </p:cNvPicPr>
+            <p:cNvGrpSpPr/>
             <p:nvPr/>
-          </p:nvPicPr>
-          <p:blipFill rotWithShape="1">
-            <a:blip r:embed="rId6">
-              <a:extLst>
-                <a:ext uri="{28A0092B-C50C-407E-A947-70E740481C1C}">
-                  <a14:useLocalDpi xmlns:a14="http://schemas.microsoft.com/office/drawing/2010/main" val="0"/>
-                </a:ext>
-              </a:extLst>
-            </a:blip>
-            <a:srcRect r="53587"/>
-            <a:stretch/>
-          </p:blipFill>
-          <p:spPr>
+          </p:nvGrpSpPr>
+          <p:grpSpPr>
             <a:xfrm>
-              <a:off x="356779" y="4407859"/>
-              <a:ext cx="1397602" cy="516849"/>
+              <a:off x="423069" y="1300760"/>
+              <a:ext cx="8383753" cy="848286"/>
+              <a:chOff x="356779" y="4082305"/>
+              <a:chExt cx="8383753" cy="848286"/>
             </a:xfrm>
-            <a:prstGeom prst="rect">
-              <a:avLst/>
-            </a:prstGeom>
-          </p:spPr>
-        </p:pic>
+          </p:grpSpPr>
+          <p:pic>
+            <p:nvPicPr>
+              <p:cNvPr id="21" name="Picture 20">
+                <a:extLst>
+                  <a:ext uri="{FF2B5EF4-FFF2-40B4-BE49-F238E27FC236}">
+                    <a16:creationId xmlns:a16="http://schemas.microsoft.com/office/drawing/2014/main" id="{67E4B6D4-FF6C-4EF1-87DB-AB18C75CA346}"/>
+                  </a:ext>
+                </a:extLst>
+              </p:cNvPr>
+              <p:cNvPicPr>
+                <a:picLocks noChangeAspect="1"/>
+              </p:cNvPicPr>
+              <p:nvPr/>
+            </p:nvPicPr>
+            <p:blipFill rotWithShape="1">
+              <a:blip r:embed="rId6">
+                <a:extLst>
+                  <a:ext uri="{28A0092B-C50C-407E-A947-70E740481C1C}">
+                    <a14:useLocalDpi xmlns:a14="http://schemas.microsoft.com/office/drawing/2010/main" val="0"/>
+                  </a:ext>
+                </a:extLst>
+              </a:blip>
+              <a:srcRect r="53587"/>
+              <a:stretch/>
+            </p:blipFill>
+            <p:spPr>
+              <a:xfrm>
+                <a:off x="356779" y="4407859"/>
+                <a:ext cx="1397602" cy="516849"/>
+              </a:xfrm>
+              <a:prstGeom prst="rect">
+                <a:avLst/>
+              </a:prstGeom>
+            </p:spPr>
+          </p:pic>
+          <p:sp>
+            <p:nvSpPr>
+              <p:cNvPr id="24" name="TextBox 23">
+                <a:extLst>
+                  <a:ext uri="{FF2B5EF4-FFF2-40B4-BE49-F238E27FC236}">
+                    <a16:creationId xmlns:a16="http://schemas.microsoft.com/office/drawing/2014/main" id="{FA471580-78FA-413F-BF9A-1FADAF76FCCC}"/>
+                  </a:ext>
+                </a:extLst>
+              </p:cNvPr>
+              <p:cNvSpPr txBox="1"/>
+              <p:nvPr/>
+            </p:nvSpPr>
+            <p:spPr>
+              <a:xfrm>
+                <a:off x="1909489" y="4105935"/>
+                <a:ext cx="697583" cy="369332"/>
+              </a:xfrm>
+              <a:prstGeom prst="rect">
+                <a:avLst/>
+              </a:prstGeom>
+              <a:noFill/>
+            </p:spPr>
+            <p:txBody>
+              <a:bodyPr wrap="square" rtlCol="0">
+                <a:spAutoFit/>
+              </a:bodyPr>
+              <a:lstStyle/>
+              <a:p>
+                <a:r>
+                  <a:rPr lang="en-SG" dirty="0"/>
+                  <a:t>Press</a:t>
+                </a:r>
+              </a:p>
+            </p:txBody>
+          </p:sp>
+          <p:grpSp>
+            <p:nvGrpSpPr>
+              <p:cNvPr id="25" name="Group 24">
+                <a:extLst>
+                  <a:ext uri="{FF2B5EF4-FFF2-40B4-BE49-F238E27FC236}">
+                    <a16:creationId xmlns:a16="http://schemas.microsoft.com/office/drawing/2014/main" id="{15F5B049-55AD-4F62-B795-8CAEBE81C1DA}"/>
+                  </a:ext>
+                </a:extLst>
+              </p:cNvPr>
+              <p:cNvGrpSpPr/>
+              <p:nvPr/>
+            </p:nvGrpSpPr>
+            <p:grpSpPr>
+              <a:xfrm>
+                <a:off x="2619933" y="4088188"/>
+                <a:ext cx="674588" cy="369332"/>
+                <a:chOff x="5487401" y="1855555"/>
+                <a:chExt cx="674588" cy="369332"/>
+              </a:xfrm>
+            </p:grpSpPr>
+            <p:sp>
+              <p:nvSpPr>
+                <p:cNvPr id="33" name="Rectangle 32">
+                  <a:extLst>
+                    <a:ext uri="{FF2B5EF4-FFF2-40B4-BE49-F238E27FC236}">
+                      <a16:creationId xmlns:a16="http://schemas.microsoft.com/office/drawing/2014/main" id="{BC0FB4F6-8B7F-470D-B570-94FD893D2DD3}"/>
+                    </a:ext>
+                  </a:extLst>
+                </p:cNvPr>
+                <p:cNvSpPr/>
+                <p:nvPr/>
+              </p:nvSpPr>
+              <p:spPr>
+                <a:xfrm>
+                  <a:off x="5487401" y="1919329"/>
+                  <a:ext cx="608599" cy="277278"/>
+                </a:xfrm>
+                <a:prstGeom prst="rect">
+                  <a:avLst/>
+                </a:prstGeom>
+                <a:ln>
+                  <a:noFill/>
+                </a:ln>
+                <a:effectLst>
+                  <a:outerShdw blurRad="107950" dist="12700" dir="5400000" algn="ctr">
+                    <a:srgbClr val="000000"/>
+                  </a:outerShdw>
+                </a:effectLst>
+                <a:scene3d>
+                  <a:camera prst="orthographicFront">
+                    <a:rot lat="0" lon="0" rev="0"/>
+                  </a:camera>
+                  <a:lightRig rig="soft" dir="t">
+                    <a:rot lat="0" lon="0" rev="0"/>
+                  </a:lightRig>
+                </a:scene3d>
+                <a:sp3d contourW="44450" prstMaterial="matte">
+                  <a:bevelT w="63500" h="63500" prst="artDeco"/>
+                  <a:contourClr>
+                    <a:srgbClr val="FFFFFF"/>
+                  </a:contourClr>
+                </a:sp3d>
+              </p:spPr>
+              <p:style>
+                <a:lnRef idx="2">
+                  <a:schemeClr val="dk1"/>
+                </a:lnRef>
+                <a:fillRef idx="1">
+                  <a:schemeClr val="lt1"/>
+                </a:fillRef>
+                <a:effectRef idx="0">
+                  <a:schemeClr val="dk1"/>
+                </a:effectRef>
+                <a:fontRef idx="minor">
+                  <a:schemeClr val="dk1"/>
+                </a:fontRef>
+              </p:style>
+              <p:txBody>
+                <a:bodyPr rtlCol="0" anchor="ctr"/>
+                <a:lstStyle/>
+                <a:p>
+                  <a:pPr algn="ctr"/>
+                  <a:endParaRPr lang="en-SG"/>
+                </a:p>
+              </p:txBody>
+            </p:sp>
+            <p:sp>
+              <p:nvSpPr>
+                <p:cNvPr id="34" name="TextBox 33">
+                  <a:extLst>
+                    <a:ext uri="{FF2B5EF4-FFF2-40B4-BE49-F238E27FC236}">
+                      <a16:creationId xmlns:a16="http://schemas.microsoft.com/office/drawing/2014/main" id="{E14E565E-147E-40FA-BFB6-6A3CFCE7D46C}"/>
+                    </a:ext>
+                  </a:extLst>
+                </p:cNvPr>
+                <p:cNvSpPr txBox="1"/>
+                <p:nvPr/>
+              </p:nvSpPr>
+              <p:spPr>
+                <a:xfrm>
+                  <a:off x="5553980" y="1855555"/>
+                  <a:ext cx="608009" cy="369332"/>
+                </a:xfrm>
+                <a:prstGeom prst="rect">
+                  <a:avLst/>
+                </a:prstGeom>
+                <a:noFill/>
+              </p:spPr>
+              <p:txBody>
+                <a:bodyPr wrap="square" rtlCol="0">
+                  <a:spAutoFit/>
+                </a:bodyPr>
+                <a:lstStyle/>
+                <a:p>
+                  <a:r>
+                    <a:rPr lang="en-SG" dirty="0"/>
+                    <a:t>Tab</a:t>
+                  </a:r>
+                </a:p>
+              </p:txBody>
+            </p:sp>
+          </p:grpSp>
+          <p:sp>
+            <p:nvSpPr>
+              <p:cNvPr id="26" name="Arrow: Right 25">
+                <a:extLst>
+                  <a:ext uri="{FF2B5EF4-FFF2-40B4-BE49-F238E27FC236}">
+                    <a16:creationId xmlns:a16="http://schemas.microsoft.com/office/drawing/2014/main" id="{1593CD46-5A4B-44A6-8457-78C780EE665D}"/>
+                  </a:ext>
+                </a:extLst>
+              </p:cNvPr>
+              <p:cNvSpPr/>
+              <p:nvPr/>
+            </p:nvSpPr>
+            <p:spPr>
+              <a:xfrm>
+                <a:off x="1896621" y="4413742"/>
+                <a:ext cx="1779320" cy="516849"/>
+              </a:xfrm>
+              <a:prstGeom prst="rightArrow">
+                <a:avLst>
+                  <a:gd name="adj1" fmla="val 46352"/>
+                  <a:gd name="adj2" fmla="val 50000"/>
+                </a:avLst>
+              </a:prstGeom>
+            </p:spPr>
+            <p:style>
+              <a:lnRef idx="2">
+                <a:schemeClr val="accent1">
+                  <a:shade val="50000"/>
+                </a:schemeClr>
+              </a:lnRef>
+              <a:fillRef idx="1">
+                <a:schemeClr val="accent1"/>
+              </a:fillRef>
+              <a:effectRef idx="0">
+                <a:schemeClr val="accent1"/>
+              </a:effectRef>
+              <a:fontRef idx="minor">
+                <a:schemeClr val="lt1"/>
+              </a:fontRef>
+            </p:style>
+            <p:txBody>
+              <a:bodyPr rtlCol="0" anchor="ctr"/>
+              <a:lstStyle/>
+              <a:p>
+                <a:pPr algn="ctr"/>
+                <a:endParaRPr lang="en-SG"/>
+              </a:p>
+            </p:txBody>
+          </p:sp>
+          <p:sp>
+            <p:nvSpPr>
+              <p:cNvPr id="27" name="TextBox 26">
+                <a:extLst>
+                  <a:ext uri="{FF2B5EF4-FFF2-40B4-BE49-F238E27FC236}">
+                    <a16:creationId xmlns:a16="http://schemas.microsoft.com/office/drawing/2014/main" id="{8C28301E-B433-4FFB-A444-1642BBC380B9}"/>
+                  </a:ext>
+                </a:extLst>
+              </p:cNvPr>
+              <p:cNvSpPr txBox="1"/>
+              <p:nvPr/>
+            </p:nvSpPr>
+            <p:spPr>
+              <a:xfrm>
+                <a:off x="6974080" y="4100052"/>
+                <a:ext cx="697583" cy="369332"/>
+              </a:xfrm>
+              <a:prstGeom prst="rect">
+                <a:avLst/>
+              </a:prstGeom>
+              <a:noFill/>
+            </p:spPr>
+            <p:txBody>
+              <a:bodyPr wrap="square" rtlCol="0">
+                <a:spAutoFit/>
+              </a:bodyPr>
+              <a:lstStyle/>
+              <a:p>
+                <a:r>
+                  <a:rPr lang="en-SG" dirty="0"/>
+                  <a:t>Press</a:t>
+                </a:r>
+              </a:p>
+            </p:txBody>
+          </p:sp>
+          <p:grpSp>
+            <p:nvGrpSpPr>
+              <p:cNvPr id="29" name="Group 28">
+                <a:extLst>
+                  <a:ext uri="{FF2B5EF4-FFF2-40B4-BE49-F238E27FC236}">
+                    <a16:creationId xmlns:a16="http://schemas.microsoft.com/office/drawing/2014/main" id="{FECCF30E-47F4-4170-BD2A-A8B696525CEA}"/>
+                  </a:ext>
+                </a:extLst>
+              </p:cNvPr>
+              <p:cNvGrpSpPr/>
+              <p:nvPr/>
+            </p:nvGrpSpPr>
+            <p:grpSpPr>
+              <a:xfrm>
+                <a:off x="7684524" y="4082305"/>
+                <a:ext cx="665161" cy="369332"/>
+                <a:chOff x="5487401" y="1855555"/>
+                <a:chExt cx="665161" cy="369332"/>
+              </a:xfrm>
+            </p:grpSpPr>
+            <p:sp>
+              <p:nvSpPr>
+                <p:cNvPr id="31" name="Rectangle 30">
+                  <a:extLst>
+                    <a:ext uri="{FF2B5EF4-FFF2-40B4-BE49-F238E27FC236}">
+                      <a16:creationId xmlns:a16="http://schemas.microsoft.com/office/drawing/2014/main" id="{D6870CF6-5DD0-43BA-A591-33C405A29E44}"/>
+                    </a:ext>
+                  </a:extLst>
+                </p:cNvPr>
+                <p:cNvSpPr/>
+                <p:nvPr/>
+              </p:nvSpPr>
+              <p:spPr>
+                <a:xfrm>
+                  <a:off x="5487401" y="1919329"/>
+                  <a:ext cx="608599" cy="277278"/>
+                </a:xfrm>
+                <a:prstGeom prst="rect">
+                  <a:avLst/>
+                </a:prstGeom>
+                <a:ln>
+                  <a:noFill/>
+                </a:ln>
+                <a:effectLst>
+                  <a:outerShdw blurRad="107950" dist="12700" dir="5400000" algn="ctr">
+                    <a:srgbClr val="000000"/>
+                  </a:outerShdw>
+                </a:effectLst>
+                <a:scene3d>
+                  <a:camera prst="orthographicFront">
+                    <a:rot lat="0" lon="0" rev="0"/>
+                  </a:camera>
+                  <a:lightRig rig="soft" dir="t">
+                    <a:rot lat="0" lon="0" rev="0"/>
+                  </a:lightRig>
+                </a:scene3d>
+                <a:sp3d contourW="44450" prstMaterial="matte">
+                  <a:bevelT w="63500" h="63500" prst="artDeco"/>
+                  <a:contourClr>
+                    <a:srgbClr val="FFFFFF"/>
+                  </a:contourClr>
+                </a:sp3d>
+              </p:spPr>
+              <p:style>
+                <a:lnRef idx="2">
+                  <a:schemeClr val="dk1"/>
+                </a:lnRef>
+                <a:fillRef idx="1">
+                  <a:schemeClr val="lt1"/>
+                </a:fillRef>
+                <a:effectRef idx="0">
+                  <a:schemeClr val="dk1"/>
+                </a:effectRef>
+                <a:fontRef idx="minor">
+                  <a:schemeClr val="dk1"/>
+                </a:fontRef>
+              </p:style>
+              <p:txBody>
+                <a:bodyPr rtlCol="0" anchor="ctr"/>
+                <a:lstStyle/>
+                <a:p>
+                  <a:pPr algn="ctr"/>
+                  <a:endParaRPr lang="en-SG"/>
+                </a:p>
+              </p:txBody>
+            </p:sp>
+            <p:sp>
+              <p:nvSpPr>
+                <p:cNvPr id="32" name="TextBox 31">
+                  <a:extLst>
+                    <a:ext uri="{FF2B5EF4-FFF2-40B4-BE49-F238E27FC236}">
+                      <a16:creationId xmlns:a16="http://schemas.microsoft.com/office/drawing/2014/main" id="{85B8830E-0C41-42CF-8185-390B886D4347}"/>
+                    </a:ext>
+                  </a:extLst>
+                </p:cNvPr>
+                <p:cNvSpPr txBox="1"/>
+                <p:nvPr/>
+              </p:nvSpPr>
+              <p:spPr>
+                <a:xfrm>
+                  <a:off x="5544553" y="1855555"/>
+                  <a:ext cx="608009" cy="369332"/>
+                </a:xfrm>
+                <a:prstGeom prst="rect">
+                  <a:avLst/>
+                </a:prstGeom>
+                <a:noFill/>
+              </p:spPr>
+              <p:txBody>
+                <a:bodyPr wrap="square" rtlCol="0">
+                  <a:spAutoFit/>
+                </a:bodyPr>
+                <a:lstStyle/>
+                <a:p>
+                  <a:r>
+                    <a:rPr lang="en-SG" dirty="0"/>
+                    <a:t>Tab</a:t>
+                  </a:r>
+                </a:p>
+              </p:txBody>
+            </p:sp>
+          </p:grpSp>
+          <p:sp>
+            <p:nvSpPr>
+              <p:cNvPr id="30" name="Arrow: Right 29">
+                <a:extLst>
+                  <a:ext uri="{FF2B5EF4-FFF2-40B4-BE49-F238E27FC236}">
+                    <a16:creationId xmlns:a16="http://schemas.microsoft.com/office/drawing/2014/main" id="{84ED6C01-D6AE-4E98-B055-0391D787E8D0}"/>
+                  </a:ext>
+                </a:extLst>
+              </p:cNvPr>
+              <p:cNvSpPr/>
+              <p:nvPr/>
+            </p:nvSpPr>
+            <p:spPr>
+              <a:xfrm>
+                <a:off x="6961212" y="4407859"/>
+                <a:ext cx="1779320" cy="516849"/>
+              </a:xfrm>
+              <a:prstGeom prst="rightArrow">
+                <a:avLst>
+                  <a:gd name="adj1" fmla="val 46352"/>
+                  <a:gd name="adj2" fmla="val 50000"/>
+                </a:avLst>
+              </a:prstGeom>
+            </p:spPr>
+            <p:style>
+              <a:lnRef idx="2">
+                <a:schemeClr val="accent1">
+                  <a:shade val="50000"/>
+                </a:schemeClr>
+              </a:lnRef>
+              <a:fillRef idx="1">
+                <a:schemeClr val="accent1"/>
+              </a:fillRef>
+              <a:effectRef idx="0">
+                <a:schemeClr val="accent1"/>
+              </a:effectRef>
+              <a:fontRef idx="minor">
+                <a:schemeClr val="lt1"/>
+              </a:fontRef>
+            </p:style>
+            <p:txBody>
+              <a:bodyPr rtlCol="0" anchor="ctr"/>
+              <a:lstStyle/>
+              <a:p>
+                <a:pPr algn="ctr"/>
+                <a:endParaRPr lang="en-SG"/>
+              </a:p>
+            </p:txBody>
+          </p:sp>
+        </p:grpSp>
         <p:pic>
           <p:nvPicPr>
-            <p:cNvPr id="22" name="Picture 21">
+            <p:cNvPr id="35" name="Picture 34">
               <a:extLst>
                 <a:ext uri="{FF2B5EF4-FFF2-40B4-BE49-F238E27FC236}">
-                  <a16:creationId xmlns:a16="http://schemas.microsoft.com/office/drawing/2014/main" id="{6E909F8D-8DB8-46CE-90AC-9A8FC438EA81}"/>
+                  <a16:creationId xmlns:a16="http://schemas.microsoft.com/office/drawing/2014/main" id="{FF8B5F8E-87DC-47FE-8AC8-1BA0C85FD5D0}"/>
                 </a:ext>
               </a:extLst>
             </p:cNvPr>
@@ -4953,8 +5449,8 @@
           </p:blipFill>
           <p:spPr>
             <a:xfrm>
-              <a:off x="3810001" y="4413602"/>
-              <a:ext cx="3021839" cy="516989"/>
+              <a:off x="3867513" y="1608914"/>
+              <a:ext cx="3021839" cy="534248"/>
             </a:xfrm>
             <a:prstGeom prst="rect">
               <a:avLst/>
@@ -4963,10 +5459,10 @@
         </p:pic>
         <p:pic>
           <p:nvPicPr>
-            <p:cNvPr id="23" name="Picture 22">
+            <p:cNvPr id="36" name="Picture 35">
               <a:extLst>
                 <a:ext uri="{FF2B5EF4-FFF2-40B4-BE49-F238E27FC236}">
-                  <a16:creationId xmlns:a16="http://schemas.microsoft.com/office/drawing/2014/main" id="{9E77E226-B62D-4467-B7C1-AC72471CB6C9}"/>
+                  <a16:creationId xmlns:a16="http://schemas.microsoft.com/office/drawing/2014/main" id="{FC58AD38-48D8-4154-9265-F39F409BEE33}"/>
                 </a:ext>
               </a:extLst>
             </p:cNvPr>
@@ -4989,426 +5485,14 @@
           </p:blipFill>
           <p:spPr>
             <a:xfrm>
-              <a:off x="8882772" y="4407858"/>
-              <a:ext cx="3027258" cy="516849"/>
+              <a:off x="8957840" y="1590839"/>
+              <a:ext cx="3016537" cy="552323"/>
             </a:xfrm>
             <a:prstGeom prst="rect">
               <a:avLst/>
             </a:prstGeom>
           </p:spPr>
         </p:pic>
-        <p:sp>
-          <p:nvSpPr>
-            <p:cNvPr id="24" name="TextBox 23">
-              <a:extLst>
-                <a:ext uri="{FF2B5EF4-FFF2-40B4-BE49-F238E27FC236}">
-                  <a16:creationId xmlns:a16="http://schemas.microsoft.com/office/drawing/2014/main" id="{FA471580-78FA-413F-BF9A-1FADAF76FCCC}"/>
-                </a:ext>
-              </a:extLst>
-            </p:cNvPr>
-            <p:cNvSpPr txBox="1"/>
-            <p:nvPr/>
-          </p:nvSpPr>
-          <p:spPr>
-            <a:xfrm>
-              <a:off x="1909489" y="4105935"/>
-              <a:ext cx="697583" cy="369332"/>
-            </a:xfrm>
-            <a:prstGeom prst="rect">
-              <a:avLst/>
-            </a:prstGeom>
-            <a:noFill/>
-          </p:spPr>
-          <p:txBody>
-            <a:bodyPr wrap="square" rtlCol="0">
-              <a:spAutoFit/>
-            </a:bodyPr>
-            <a:lstStyle/>
-            <a:p>
-              <a:r>
-                <a:rPr lang="en-SG" dirty="0"/>
-                <a:t>Press</a:t>
-              </a:r>
-            </a:p>
-          </p:txBody>
-        </p:sp>
-        <p:grpSp>
-          <p:nvGrpSpPr>
-            <p:cNvPr id="25" name="Group 24">
-              <a:extLst>
-                <a:ext uri="{FF2B5EF4-FFF2-40B4-BE49-F238E27FC236}">
-                  <a16:creationId xmlns:a16="http://schemas.microsoft.com/office/drawing/2014/main" id="{15F5B049-55AD-4F62-B795-8CAEBE81C1DA}"/>
-                </a:ext>
-              </a:extLst>
-            </p:cNvPr>
-            <p:cNvGrpSpPr/>
-            <p:nvPr/>
-          </p:nvGrpSpPr>
-          <p:grpSpPr>
-            <a:xfrm>
-              <a:off x="2619933" y="4088188"/>
-              <a:ext cx="674588" cy="369332"/>
-              <a:chOff x="5487401" y="1855555"/>
-              <a:chExt cx="674588" cy="369332"/>
-            </a:xfrm>
-          </p:grpSpPr>
-          <p:sp>
-            <p:nvSpPr>
-              <p:cNvPr id="33" name="Rectangle 32">
-                <a:extLst>
-                  <a:ext uri="{FF2B5EF4-FFF2-40B4-BE49-F238E27FC236}">
-                    <a16:creationId xmlns:a16="http://schemas.microsoft.com/office/drawing/2014/main" id="{BC0FB4F6-8B7F-470D-B570-94FD893D2DD3}"/>
-                  </a:ext>
-                </a:extLst>
-              </p:cNvPr>
-              <p:cNvSpPr/>
-              <p:nvPr/>
-            </p:nvSpPr>
-            <p:spPr>
-              <a:xfrm>
-                <a:off x="5487401" y="1919329"/>
-                <a:ext cx="608599" cy="277278"/>
-              </a:xfrm>
-              <a:prstGeom prst="rect">
-                <a:avLst/>
-              </a:prstGeom>
-              <a:ln>
-                <a:noFill/>
-              </a:ln>
-              <a:effectLst>
-                <a:outerShdw blurRad="107950" dist="12700" dir="5400000" algn="ctr">
-                  <a:srgbClr val="000000"/>
-                </a:outerShdw>
-              </a:effectLst>
-              <a:scene3d>
-                <a:camera prst="orthographicFront">
-                  <a:rot lat="0" lon="0" rev="0"/>
-                </a:camera>
-                <a:lightRig rig="soft" dir="t">
-                  <a:rot lat="0" lon="0" rev="0"/>
-                </a:lightRig>
-              </a:scene3d>
-              <a:sp3d contourW="44450" prstMaterial="matte">
-                <a:bevelT w="63500" h="63500" prst="artDeco"/>
-                <a:contourClr>
-                  <a:srgbClr val="FFFFFF"/>
-                </a:contourClr>
-              </a:sp3d>
-            </p:spPr>
-            <p:style>
-              <a:lnRef idx="2">
-                <a:schemeClr val="dk1"/>
-              </a:lnRef>
-              <a:fillRef idx="1">
-                <a:schemeClr val="lt1"/>
-              </a:fillRef>
-              <a:effectRef idx="0">
-                <a:schemeClr val="dk1"/>
-              </a:effectRef>
-              <a:fontRef idx="minor">
-                <a:schemeClr val="dk1"/>
-              </a:fontRef>
-            </p:style>
-            <p:txBody>
-              <a:bodyPr rtlCol="0" anchor="ctr"/>
-              <a:lstStyle/>
-              <a:p>
-                <a:pPr algn="ctr"/>
-                <a:endParaRPr lang="en-SG"/>
-              </a:p>
-            </p:txBody>
-          </p:sp>
-          <p:sp>
-            <p:nvSpPr>
-              <p:cNvPr id="34" name="TextBox 33">
-                <a:extLst>
-                  <a:ext uri="{FF2B5EF4-FFF2-40B4-BE49-F238E27FC236}">
-                    <a16:creationId xmlns:a16="http://schemas.microsoft.com/office/drawing/2014/main" id="{E14E565E-147E-40FA-BFB6-6A3CFCE7D46C}"/>
-                  </a:ext>
-                </a:extLst>
-              </p:cNvPr>
-              <p:cNvSpPr txBox="1"/>
-              <p:nvPr/>
-            </p:nvSpPr>
-            <p:spPr>
-              <a:xfrm>
-                <a:off x="5553980" y="1855555"/>
-                <a:ext cx="608009" cy="369332"/>
-              </a:xfrm>
-              <a:prstGeom prst="rect">
-                <a:avLst/>
-              </a:prstGeom>
-              <a:noFill/>
-            </p:spPr>
-            <p:txBody>
-              <a:bodyPr wrap="square" rtlCol="0">
-                <a:spAutoFit/>
-              </a:bodyPr>
-              <a:lstStyle/>
-              <a:p>
-                <a:r>
-                  <a:rPr lang="en-SG" dirty="0"/>
-                  <a:t>Tab</a:t>
-                </a:r>
-              </a:p>
-            </p:txBody>
-          </p:sp>
-        </p:grpSp>
-        <p:sp>
-          <p:nvSpPr>
-            <p:cNvPr id="26" name="Arrow: Right 25">
-              <a:extLst>
-                <a:ext uri="{FF2B5EF4-FFF2-40B4-BE49-F238E27FC236}">
-                  <a16:creationId xmlns:a16="http://schemas.microsoft.com/office/drawing/2014/main" id="{1593CD46-5A4B-44A6-8457-78C780EE665D}"/>
-                </a:ext>
-              </a:extLst>
-            </p:cNvPr>
-            <p:cNvSpPr/>
-            <p:nvPr/>
-          </p:nvSpPr>
-          <p:spPr>
-            <a:xfrm>
-              <a:off x="1896621" y="4413742"/>
-              <a:ext cx="1779320" cy="516849"/>
-            </a:xfrm>
-            <a:prstGeom prst="rightArrow">
-              <a:avLst>
-                <a:gd name="adj1" fmla="val 46352"/>
-                <a:gd name="adj2" fmla="val 50000"/>
-              </a:avLst>
-            </a:prstGeom>
-          </p:spPr>
-          <p:style>
-            <a:lnRef idx="2">
-              <a:schemeClr val="accent1">
-                <a:shade val="50000"/>
-              </a:schemeClr>
-            </a:lnRef>
-            <a:fillRef idx="1">
-              <a:schemeClr val="accent1"/>
-            </a:fillRef>
-            <a:effectRef idx="0">
-              <a:schemeClr val="accent1"/>
-            </a:effectRef>
-            <a:fontRef idx="minor">
-              <a:schemeClr val="lt1"/>
-            </a:fontRef>
-          </p:style>
-          <p:txBody>
-            <a:bodyPr rtlCol="0" anchor="ctr"/>
-            <a:lstStyle/>
-            <a:p>
-              <a:pPr algn="ctr"/>
-              <a:endParaRPr lang="en-SG"/>
-            </a:p>
-          </p:txBody>
-        </p:sp>
-        <p:sp>
-          <p:nvSpPr>
-            <p:cNvPr id="27" name="TextBox 26">
-              <a:extLst>
-                <a:ext uri="{FF2B5EF4-FFF2-40B4-BE49-F238E27FC236}">
-                  <a16:creationId xmlns:a16="http://schemas.microsoft.com/office/drawing/2014/main" id="{8C28301E-B433-4FFB-A444-1642BBC380B9}"/>
-                </a:ext>
-              </a:extLst>
-            </p:cNvPr>
-            <p:cNvSpPr txBox="1"/>
-            <p:nvPr/>
-          </p:nvSpPr>
-          <p:spPr>
-            <a:xfrm>
-              <a:off x="6974080" y="4100052"/>
-              <a:ext cx="697583" cy="369332"/>
-            </a:xfrm>
-            <a:prstGeom prst="rect">
-              <a:avLst/>
-            </a:prstGeom>
-            <a:noFill/>
-          </p:spPr>
-          <p:txBody>
-            <a:bodyPr wrap="square" rtlCol="0">
-              <a:spAutoFit/>
-            </a:bodyPr>
-            <a:lstStyle/>
-            <a:p>
-              <a:r>
-                <a:rPr lang="en-SG" dirty="0"/>
-                <a:t>Press</a:t>
-              </a:r>
-            </a:p>
-          </p:txBody>
-        </p:sp>
-        <p:grpSp>
-          <p:nvGrpSpPr>
-            <p:cNvPr id="29" name="Group 28">
-              <a:extLst>
-                <a:ext uri="{FF2B5EF4-FFF2-40B4-BE49-F238E27FC236}">
-                  <a16:creationId xmlns:a16="http://schemas.microsoft.com/office/drawing/2014/main" id="{FECCF30E-47F4-4170-BD2A-A8B696525CEA}"/>
-                </a:ext>
-              </a:extLst>
-            </p:cNvPr>
-            <p:cNvGrpSpPr/>
-            <p:nvPr/>
-          </p:nvGrpSpPr>
-          <p:grpSpPr>
-            <a:xfrm>
-              <a:off x="7684524" y="4082305"/>
-              <a:ext cx="665161" cy="369332"/>
-              <a:chOff x="5487401" y="1855555"/>
-              <a:chExt cx="665161" cy="369332"/>
-            </a:xfrm>
-          </p:grpSpPr>
-          <p:sp>
-            <p:nvSpPr>
-              <p:cNvPr id="31" name="Rectangle 30">
-                <a:extLst>
-                  <a:ext uri="{FF2B5EF4-FFF2-40B4-BE49-F238E27FC236}">
-                    <a16:creationId xmlns:a16="http://schemas.microsoft.com/office/drawing/2014/main" id="{D6870CF6-5DD0-43BA-A591-33C405A29E44}"/>
-                  </a:ext>
-                </a:extLst>
-              </p:cNvPr>
-              <p:cNvSpPr/>
-              <p:nvPr/>
-            </p:nvSpPr>
-            <p:spPr>
-              <a:xfrm>
-                <a:off x="5487401" y="1919329"/>
-                <a:ext cx="608599" cy="277278"/>
-              </a:xfrm>
-              <a:prstGeom prst="rect">
-                <a:avLst/>
-              </a:prstGeom>
-              <a:ln>
-                <a:noFill/>
-              </a:ln>
-              <a:effectLst>
-                <a:outerShdw blurRad="107950" dist="12700" dir="5400000" algn="ctr">
-                  <a:srgbClr val="000000"/>
-                </a:outerShdw>
-              </a:effectLst>
-              <a:scene3d>
-                <a:camera prst="orthographicFront">
-                  <a:rot lat="0" lon="0" rev="0"/>
-                </a:camera>
-                <a:lightRig rig="soft" dir="t">
-                  <a:rot lat="0" lon="0" rev="0"/>
-                </a:lightRig>
-              </a:scene3d>
-              <a:sp3d contourW="44450" prstMaterial="matte">
-                <a:bevelT w="63500" h="63500" prst="artDeco"/>
-                <a:contourClr>
-                  <a:srgbClr val="FFFFFF"/>
-                </a:contourClr>
-              </a:sp3d>
-            </p:spPr>
-            <p:style>
-              <a:lnRef idx="2">
-                <a:schemeClr val="dk1"/>
-              </a:lnRef>
-              <a:fillRef idx="1">
-                <a:schemeClr val="lt1"/>
-              </a:fillRef>
-              <a:effectRef idx="0">
-                <a:schemeClr val="dk1"/>
-              </a:effectRef>
-              <a:fontRef idx="minor">
-                <a:schemeClr val="dk1"/>
-              </a:fontRef>
-            </p:style>
-            <p:txBody>
-              <a:bodyPr rtlCol="0" anchor="ctr"/>
-              <a:lstStyle/>
-              <a:p>
-                <a:pPr algn="ctr"/>
-                <a:endParaRPr lang="en-SG"/>
-              </a:p>
-            </p:txBody>
-          </p:sp>
-          <p:sp>
-            <p:nvSpPr>
-              <p:cNvPr id="32" name="TextBox 31">
-                <a:extLst>
-                  <a:ext uri="{FF2B5EF4-FFF2-40B4-BE49-F238E27FC236}">
-                    <a16:creationId xmlns:a16="http://schemas.microsoft.com/office/drawing/2014/main" id="{85B8830E-0C41-42CF-8185-390B886D4347}"/>
-                  </a:ext>
-                </a:extLst>
-              </p:cNvPr>
-              <p:cNvSpPr txBox="1"/>
-              <p:nvPr/>
-            </p:nvSpPr>
-            <p:spPr>
-              <a:xfrm>
-                <a:off x="5544553" y="1855555"/>
-                <a:ext cx="608009" cy="369332"/>
-              </a:xfrm>
-              <a:prstGeom prst="rect">
-                <a:avLst/>
-              </a:prstGeom>
-              <a:noFill/>
-            </p:spPr>
-            <p:txBody>
-              <a:bodyPr wrap="square" rtlCol="0">
-                <a:spAutoFit/>
-              </a:bodyPr>
-              <a:lstStyle/>
-              <a:p>
-                <a:r>
-                  <a:rPr lang="en-SG" dirty="0"/>
-                  <a:t>Tab</a:t>
-                </a:r>
-              </a:p>
-            </p:txBody>
-          </p:sp>
-        </p:grpSp>
-        <p:sp>
-          <p:nvSpPr>
-            <p:cNvPr id="30" name="Arrow: Right 29">
-              <a:extLst>
-                <a:ext uri="{FF2B5EF4-FFF2-40B4-BE49-F238E27FC236}">
-                  <a16:creationId xmlns:a16="http://schemas.microsoft.com/office/drawing/2014/main" id="{84ED6C01-D6AE-4E98-B055-0391D787E8D0}"/>
-                </a:ext>
-              </a:extLst>
-            </p:cNvPr>
-            <p:cNvSpPr/>
-            <p:nvPr/>
-          </p:nvSpPr>
-          <p:spPr>
-            <a:xfrm>
-              <a:off x="6961212" y="4407859"/>
-              <a:ext cx="1779320" cy="516849"/>
-            </a:xfrm>
-            <a:prstGeom prst="rightArrow">
-              <a:avLst>
-                <a:gd name="adj1" fmla="val 46352"/>
-                <a:gd name="adj2" fmla="val 50000"/>
-              </a:avLst>
-            </a:prstGeom>
-          </p:spPr>
-          <p:style>
-            <a:lnRef idx="2">
-              <a:schemeClr val="accent1">
-                <a:shade val="50000"/>
-              </a:schemeClr>
-            </a:lnRef>
-            <a:fillRef idx="1">
-              <a:schemeClr val="accent1"/>
-            </a:fillRef>
-            <a:effectRef idx="0">
-              <a:schemeClr val="accent1"/>
-            </a:effectRef>
-            <a:fontRef idx="minor">
-              <a:schemeClr val="lt1"/>
-            </a:fontRef>
-          </p:style>
-          <p:txBody>
-            <a:bodyPr rtlCol="0" anchor="ctr"/>
-            <a:lstStyle/>
-            <a:p>
-              <a:pPr algn="ctr"/>
-              <a:endParaRPr lang="en-SG"/>
-            </a:p>
-          </p:txBody>
-        </p:sp>
       </p:grpSp>
     </p:spTree>
     <p:extLst>

</xml_diff>